<commit_message>
Uprav prezentaci k obhajobě
...na základě feedbacku od vedoucího
</commit_message>
<xml_diff>
--- a/defense/David Straka - Editor zdrojových kódů WooWoo dokumentů.pptx
+++ b/defense/David Straka - Editor zdrojových kódů WooWoo dokumentů.pptx
@@ -7,16 +7,17 @@
   <p:sldIdLst>
     <p:sldId id="273" r:id="rId2"/>
     <p:sldId id="274" r:id="rId3"/>
-    <p:sldId id="275" r:id="rId4"/>
-    <p:sldId id="276" r:id="rId5"/>
-    <p:sldId id="277" r:id="rId6"/>
-    <p:sldId id="278" r:id="rId7"/>
-    <p:sldId id="272" r:id="rId8"/>
-    <p:sldId id="271" r:id="rId9"/>
-    <p:sldId id="279" r:id="rId10"/>
-    <p:sldId id="282" r:id="rId11"/>
-    <p:sldId id="283" r:id="rId12"/>
-    <p:sldId id="280" r:id="rId13"/>
+    <p:sldId id="272" r:id="rId4"/>
+    <p:sldId id="285" r:id="rId5"/>
+    <p:sldId id="275" r:id="rId6"/>
+    <p:sldId id="276" r:id="rId7"/>
+    <p:sldId id="278" r:id="rId8"/>
+    <p:sldId id="284" r:id="rId9"/>
+    <p:sldId id="271" r:id="rId10"/>
+    <p:sldId id="279" r:id="rId11"/>
+    <p:sldId id="282" r:id="rId12"/>
+    <p:sldId id="283" r:id="rId13"/>
+    <p:sldId id="280" r:id="rId14"/>
   </p:sldIdLst>
   <p:sldSz cx="12192000" cy="6858000"/>
   <p:notesSz cx="6858000" cy="9144000"/>
@@ -293,7 +294,7 @@
             <a:fld id="{5586B75A-687E-405C-8A0B-8D00578BA2C3}" type="datetimeFigureOut">
               <a:rPr lang="en-US" smtClean="0"/>
               <a:pPr/>
-              <a:t>6/10/2021</a:t>
+              <a:t>6/18/2021</a:t>
             </a:fld>
             <a:endParaRPr lang="en-US" dirty="0"/>
           </a:p>
@@ -624,7 +625,7 @@
           <a:p>
             <a:fld id="{5F4E5243-F52A-4D37-9694-EB26C6C31910}" type="datetimeFigureOut">
               <a:rPr lang="en-US" smtClean="0"/>
-              <a:t>6/10/2021</a:t>
+              <a:t>6/18/2021</a:t>
             </a:fld>
             <a:endParaRPr lang="en-US" dirty="0"/>
           </a:p>
@@ -804,7 +805,7 @@
           <a:p>
             <a:fld id="{3A77B6E1-634A-48DC-9E8B-D894023267EF}" type="datetimeFigureOut">
               <a:rPr lang="en-US" smtClean="0"/>
-              <a:t>6/10/2021</a:t>
+              <a:t>6/18/2021</a:t>
             </a:fld>
             <a:endParaRPr lang="en-US" dirty="0"/>
           </a:p>
@@ -975,7 +976,7 @@
             <a:fld id="{5586B75A-687E-405C-8A0B-8D00578BA2C3}" type="datetimeFigureOut">
               <a:rPr lang="en-US" smtClean="0"/>
               <a:pPr/>
-              <a:t>6/10/2021</a:t>
+              <a:t>6/18/2021</a:t>
             </a:fld>
             <a:endParaRPr lang="en-US" dirty="0"/>
           </a:p>
@@ -1255,7 +1256,7 @@
             <a:fld id="{5586B75A-687E-405C-8A0B-8D00578BA2C3}" type="datetimeFigureOut">
               <a:rPr lang="en-US" smtClean="0"/>
               <a:pPr/>
-              <a:t>6/10/2021</a:t>
+              <a:t>6/18/2021</a:t>
             </a:fld>
             <a:endParaRPr lang="en-US" dirty="0"/>
           </a:p>
@@ -1650,7 +1651,7 @@
           <a:p>
             <a:fld id="{F12952B5-7A2F-4CC8-B7CE-9234E21C2837}" type="datetimeFigureOut">
               <a:rPr lang="en-US" smtClean="0"/>
-              <a:t>6/10/2021</a:t>
+              <a:t>6/18/2021</a:t>
             </a:fld>
             <a:endParaRPr lang="en-US" dirty="0"/>
           </a:p>
@@ -2127,7 +2128,7 @@
           <a:p>
             <a:fld id="{CE1DA07A-9201-4B4B-BAF2-015AFA30F520}" type="datetimeFigureOut">
               <a:rPr lang="en-US" smtClean="0"/>
-              <a:t>6/10/2021</a:t>
+              <a:t>6/18/2021</a:t>
             </a:fld>
             <a:endParaRPr lang="en-US" dirty="0"/>
           </a:p>
@@ -2245,7 +2246,7 @@
           <a:p>
             <a:fld id="{73D7E00A-486F-4252-8B1D-E32645521F49}" type="datetimeFigureOut">
               <a:rPr lang="en-US" smtClean="0"/>
-              <a:t>6/10/2021</a:t>
+              <a:t>6/18/2021</a:t>
             </a:fld>
             <a:endParaRPr lang="en-US" dirty="0"/>
           </a:p>
@@ -2340,7 +2341,7 @@
           <a:p>
             <a:fld id="{8DDF5F92-E675-4B36-9A60-69A962A68675}" type="datetimeFigureOut">
               <a:rPr lang="en-US" smtClean="0"/>
-              <a:t>6/10/2021</a:t>
+              <a:t>6/18/2021</a:t>
             </a:fld>
             <a:endParaRPr lang="en-US" dirty="0"/>
           </a:p>
@@ -2686,7 +2687,7 @@
           <a:p>
             <a:fld id="{AF6E2C9B-5FA2-460D-9BE7-B0812FC2A6FF}" type="datetimeFigureOut">
               <a:rPr lang="en-US" smtClean="0"/>
-              <a:t>6/10/2021</a:t>
+              <a:t>6/18/2021</a:t>
             </a:fld>
             <a:endParaRPr lang="en-US" dirty="0"/>
           </a:p>
@@ -3076,7 +3077,7 @@
             <a:fld id="{5586B75A-687E-405C-8A0B-8D00578BA2C3}" type="datetimeFigureOut">
               <a:rPr lang="en-US" smtClean="0"/>
               <a:pPr/>
-              <a:t>6/10/2021</a:t>
+              <a:t>6/18/2021</a:t>
             </a:fld>
             <a:endParaRPr lang="en-US" dirty="0"/>
           </a:p>
@@ -3356,7 +3357,7 @@
             <a:fld id="{5586B75A-687E-405C-8A0B-8D00578BA2C3}" type="datetimeFigureOut">
               <a:rPr lang="en-US" smtClean="0"/>
               <a:pPr/>
-              <a:t>6/10/2021</a:t>
+              <a:t>6/18/2021</a:t>
             </a:fld>
             <a:endParaRPr lang="en-US" dirty="0"/>
           </a:p>
@@ -4260,7 +4261,7 @@
           <a:p>
             <a:r>
               <a:rPr lang="cs-CZ" sz="5400" dirty="0"/>
-              <a:t>Otázka oponenta</a:t>
+              <a:t>Závěr</a:t>
             </a:r>
           </a:p>
         </p:txBody>
@@ -4278,13 +4279,13 @@
             <a:spLocks noGrp="1"/>
           </p:cNvSpPr>
           <p:nvPr>
-            <p:ph sz="half" idx="1"/>
-          </p:nvPr>
-        </p:nvSpPr>
-        <p:spPr>
-          <a:xfrm>
-            <a:off x="1371600" y="2094405"/>
-            <a:ext cx="4447786" cy="3581401"/>
+            <p:ph idx="1"/>
+          </p:nvPr>
+        </p:nvSpPr>
+        <p:spPr>
+          <a:xfrm>
+            <a:off x="1371600" y="2094407"/>
+            <a:ext cx="9601200" cy="3931923"/>
           </a:xfrm>
         </p:spPr>
         <p:txBody>
@@ -4300,15 +4301,29 @@
             </a:pPr>
             <a:r>
               <a:rPr lang="cs-CZ" sz="2400" dirty="0"/>
-              <a:t>„Proč jste do průzkumu moderních a rozšiřitelných editorů nezahrnul další, např. </a:t>
-            </a:r>
-            <a:r>
-              <a:rPr lang="cs-CZ" sz="2400" dirty="0" err="1"/>
-              <a:t>IntelliJ</a:t>
-            </a:r>
+              <a:t>Rozšíření lze nainstalovat přímo z Atomu</a:t>
+            </a:r>
+          </a:p>
+          <a:p>
+            <a:pPr>
+              <a:lnSpc>
+                <a:spcPct val="95000"/>
+              </a:lnSpc>
+            </a:pPr>
             <a:r>
               <a:rPr lang="cs-CZ" sz="2400" dirty="0"/>
-              <a:t> IDEA? Bylo nějaké výběrové kritérium, které další editory vyřadilo, případně jaký byl k tomuto kritériu důvod?“</a:t>
+              <a:t>Možnost mnoha vylepšení v budoucnu (synchronní posun náhledu, podpora více šablon, …)</a:t>
+            </a:r>
+          </a:p>
+          <a:p>
+            <a:pPr>
+              <a:lnSpc>
+                <a:spcPct val="95000"/>
+              </a:lnSpc>
+            </a:pPr>
+            <a:r>
+              <a:rPr lang="cs-CZ" sz="2400" dirty="0"/>
+              <a:t>Usnadnění tvorby studijních textů (např. kvůli reakreditaci)</a:t>
             </a:r>
           </a:p>
         </p:txBody>
@@ -4316,7 +4331,7 @@
     </p:spTree>
     <p:extLst>
       <p:ext uri="{BB962C8B-B14F-4D97-AF65-F5344CB8AC3E}">
-        <p14:creationId xmlns:p14="http://schemas.microsoft.com/office/powerpoint/2010/main" val="36743219"/>
+        <p14:creationId xmlns:p14="http://schemas.microsoft.com/office/powerpoint/2010/main" val="368420680"/>
       </p:ext>
     </p:extLst>
   </p:cSld>
@@ -4426,6 +4441,119 @@
           </a:p>
         </p:txBody>
       </p:sp>
+    </p:spTree>
+    <p:extLst>
+      <p:ext uri="{BB962C8B-B14F-4D97-AF65-F5344CB8AC3E}">
+        <p14:creationId xmlns:p14="http://schemas.microsoft.com/office/powerpoint/2010/main" val="36743219"/>
+      </p:ext>
+    </p:extLst>
+  </p:cSld>
+  <p:clrMapOvr>
+    <a:masterClrMapping/>
+  </p:clrMapOvr>
+</p:sld>
+</file>
+
+<file path=ppt/slides/slide12.xml><?xml version="1.0" encoding="utf-8"?>
+<p:sld xmlns:a="http://schemas.openxmlformats.org/drawingml/2006/main" xmlns:r="http://schemas.openxmlformats.org/officeDocument/2006/relationships" xmlns:p="http://schemas.openxmlformats.org/presentationml/2006/main">
+  <p:cSld>
+    <p:spTree>
+      <p:nvGrpSpPr>
+        <p:cNvPr id="1" name=""/>
+        <p:cNvGrpSpPr/>
+        <p:nvPr/>
+      </p:nvGrpSpPr>
+      <p:grpSpPr>
+        <a:xfrm>
+          <a:off x="0" y="0"/>
+          <a:ext cx="0" cy="0"/>
+          <a:chOff x="0" y="0"/>
+          <a:chExt cx="0" cy="0"/>
+        </a:xfrm>
+      </p:grpSpPr>
+      <p:sp>
+        <p:nvSpPr>
+          <p:cNvPr id="2" name="Nadpis 1">
+            <a:extLst>
+              <a:ext uri="{FF2B5EF4-FFF2-40B4-BE49-F238E27FC236}">
+                <a16:creationId xmlns:a16="http://schemas.microsoft.com/office/drawing/2014/main" id="{549A5A5D-6404-4273-ABC2-8746AA0BC62C}"/>
+              </a:ext>
+            </a:extLst>
+          </p:cNvPr>
+          <p:cNvSpPr>
+            <a:spLocks noGrp="1"/>
+          </p:cNvSpPr>
+          <p:nvPr>
+            <p:ph type="title"/>
+          </p:nvPr>
+        </p:nvSpPr>
+        <p:spPr>
+          <a:xfrm>
+            <a:off x="1371600" y="703218"/>
+            <a:ext cx="9601200" cy="1485900"/>
+          </a:xfrm>
+        </p:spPr>
+        <p:txBody>
+          <a:bodyPr>
+            <a:normAutofit/>
+          </a:bodyPr>
+          <a:lstStyle/>
+          <a:p>
+            <a:r>
+              <a:rPr lang="cs-CZ" sz="5400" dirty="0"/>
+              <a:t>Otázka oponenta</a:t>
+            </a:r>
+          </a:p>
+        </p:txBody>
+      </p:sp>
+      <p:sp>
+        <p:nvSpPr>
+          <p:cNvPr id="3" name="Zástupný obsah 2">
+            <a:extLst>
+              <a:ext uri="{FF2B5EF4-FFF2-40B4-BE49-F238E27FC236}">
+                <a16:creationId xmlns:a16="http://schemas.microsoft.com/office/drawing/2014/main" id="{1EDB8F96-D142-46B1-9AEA-ABE2773ED79C}"/>
+              </a:ext>
+            </a:extLst>
+          </p:cNvPr>
+          <p:cNvSpPr>
+            <a:spLocks noGrp="1"/>
+          </p:cNvSpPr>
+          <p:nvPr>
+            <p:ph sz="half" idx="1"/>
+          </p:nvPr>
+        </p:nvSpPr>
+        <p:spPr>
+          <a:xfrm>
+            <a:off x="1371600" y="2094405"/>
+            <a:ext cx="4447786" cy="3581401"/>
+          </a:xfrm>
+        </p:spPr>
+        <p:txBody>
+          <a:bodyPr>
+            <a:noAutofit/>
+          </a:bodyPr>
+          <a:lstStyle/>
+          <a:p>
+            <a:pPr>
+              <a:lnSpc>
+                <a:spcPct val="95000"/>
+              </a:lnSpc>
+            </a:pPr>
+            <a:r>
+              <a:rPr lang="cs-CZ" sz="2400" dirty="0"/>
+              <a:t>„Proč jste do průzkumu moderních a rozšiřitelných editorů nezahrnul další, např. </a:t>
+            </a:r>
+            <a:r>
+              <a:rPr lang="cs-CZ" sz="2400" dirty="0" err="1"/>
+              <a:t>IntelliJ</a:t>
+            </a:r>
+            <a:r>
+              <a:rPr lang="cs-CZ" sz="2400" dirty="0"/>
+              <a:t> IDEA? Bylo nějaké výběrové kritérium, které další editory vyřadilo, případně jaký byl k tomuto kritériu důvod?“</a:t>
+            </a:r>
+          </a:p>
+        </p:txBody>
+      </p:sp>
       <p:sp>
         <p:nvSpPr>
           <p:cNvPr id="4" name="Zástupný obsah 3">
@@ -4506,7 +4634,7 @@
 </p:sld>
 </file>
 
-<file path=ppt/slides/slide12.xml><?xml version="1.0" encoding="utf-8"?>
+<file path=ppt/slides/slide13.xml><?xml version="1.0" encoding="utf-8"?>
 <p:sld xmlns:a="http://schemas.openxmlformats.org/drawingml/2006/main" xmlns:r="http://schemas.openxmlformats.org/officeDocument/2006/relationships" xmlns:p="http://schemas.openxmlformats.org/presentationml/2006/main">
   <p:cSld>
     <p:bg>
@@ -4987,15 +5115,7 @@
             </a:pPr>
             <a:r>
               <a:rPr lang="cs-CZ" sz="2400" dirty="0"/>
-              <a:t>Vznik a použití na FIT ČVUT (šablona FIT </a:t>
-            </a:r>
-            <a:r>
-              <a:rPr lang="cs-CZ" sz="2400" dirty="0" err="1"/>
-              <a:t>Template</a:t>
-            </a:r>
-            <a:r>
-              <a:rPr lang="cs-CZ" sz="2400" dirty="0"/>
-              <a:t>)</a:t>
+              <a:t>Vznik a použití na FIT ČVUT</a:t>
             </a:r>
           </a:p>
           <a:p>
@@ -5060,6 +5180,14 @@
 <file path=ppt/slides/slide3.xml><?xml version="1.0" encoding="utf-8"?>
 <p:sld xmlns:a="http://schemas.openxmlformats.org/drawingml/2006/main" xmlns:r="http://schemas.openxmlformats.org/officeDocument/2006/relationships" xmlns:p="http://schemas.openxmlformats.org/presentationml/2006/main">
   <p:cSld>
+    <p:bg>
+      <p:bgPr>
+        <a:solidFill>
+          <a:schemeClr val="bg2"/>
+        </a:solidFill>
+        <a:effectLst/>
+      </p:bgPr>
+    </p:bg>
     <p:spTree>
       <p:nvGrpSpPr>
         <p:cNvPr id="1" name=""/>
@@ -5076,161 +5204,477 @@
       </p:grpSpPr>
       <p:sp>
         <p:nvSpPr>
-          <p:cNvPr id="2" name="Nadpis 1">
+          <p:cNvPr id="26" name="Rectangle 25">
             <a:extLst>
               <a:ext uri="{FF2B5EF4-FFF2-40B4-BE49-F238E27FC236}">
-                <a16:creationId xmlns:a16="http://schemas.microsoft.com/office/drawing/2014/main" id="{549A5A5D-6404-4273-ABC2-8746AA0BC62C}"/>
+                <a16:creationId xmlns:a16="http://schemas.microsoft.com/office/drawing/2014/main" id="{AA6EC888-B85F-410F-B430-06583E94BEEC}"/>
+              </a:ext>
+              <a:ext uri="{C183D7F6-B498-43B3-948B-1728B52AA6E4}">
+                <adec:decorative xmlns:adec="http://schemas.microsoft.com/office/drawing/2017/decorative" val="1"/>
               </a:ext>
             </a:extLst>
           </p:cNvPr>
           <p:cNvSpPr>
-            <a:spLocks noGrp="1"/>
-          </p:cNvSpPr>
-          <p:nvPr>
-            <p:ph type="title"/>
-          </p:nvPr>
-        </p:nvSpPr>
-        <p:spPr>
-          <a:xfrm>
-            <a:off x="1371600" y="703218"/>
-            <a:ext cx="9601200" cy="1485900"/>
-          </a:xfrm>
-        </p:spPr>
-        <p:txBody>
-          <a:bodyPr>
-            <a:normAutofit/>
-          </a:bodyPr>
-          <a:lstStyle/>
-          <a:p>
-            <a:r>
-              <a:rPr lang="cs-CZ" sz="5400" dirty="0"/>
-              <a:t>Cíle</a:t>
-            </a:r>
-          </a:p>
-        </p:txBody>
-      </p:sp>
-      <p:sp>
-        <p:nvSpPr>
-          <p:cNvPr id="3" name="Zástupný obsah 2">
+            <a:spLocks noGrp="1" noRot="1" noChangeAspect="1" noMove="1" noResize="1" noEditPoints="1" noAdjustHandles="1" noChangeArrowheads="1" noChangeShapeType="1" noTextEdit="1"/>
+          </p:cNvSpPr>
+          <p:nvPr>
+            <p:extLst>
+              <p:ext uri="{386F3935-93C4-4BCD-93E2-E3B085C9AB24}">
+                <p16:designElem xmlns:p16="http://schemas.microsoft.com/office/powerpoint/2015/main" val="1"/>
+              </p:ext>
+            </p:extLst>
+          </p:nvPr>
+        </p:nvSpPr>
+        <p:spPr>
+          <a:xfrm>
+            <a:off x="478095" y="376"/>
+            <a:ext cx="228600" cy="6858000"/>
+          </a:xfrm>
+          <a:prstGeom prst="rect">
+            <a:avLst/>
+          </a:prstGeom>
+          <a:solidFill>
+            <a:schemeClr val="tx2"/>
+          </a:solidFill>
+          <a:ln>
+            <a:noFill/>
+          </a:ln>
+        </p:spPr>
+        <p:style>
+          <a:lnRef idx="2">
+            <a:schemeClr val="accent1">
+              <a:shade val="50000"/>
+            </a:schemeClr>
+          </a:lnRef>
+          <a:fillRef idx="1">
+            <a:schemeClr val="accent1"/>
+          </a:fillRef>
+          <a:effectRef idx="0">
+            <a:schemeClr val="accent1"/>
+          </a:effectRef>
+          <a:fontRef idx="minor">
+            <a:schemeClr val="lt1"/>
+          </a:fontRef>
+        </p:style>
+      </p:sp>
+      <p:sp>
+        <p:nvSpPr>
+          <p:cNvPr id="28" name="Rectangle 27">
             <a:extLst>
               <a:ext uri="{FF2B5EF4-FFF2-40B4-BE49-F238E27FC236}">
-                <a16:creationId xmlns:a16="http://schemas.microsoft.com/office/drawing/2014/main" id="{1EDB8F96-D142-46B1-9AEA-ABE2773ED79C}"/>
+                <a16:creationId xmlns:a16="http://schemas.microsoft.com/office/drawing/2014/main" id="{9485DA84-CB73-4E5E-9864-2460CE28055D}"/>
+              </a:ext>
+              <a:ext uri="{C183D7F6-B498-43B3-948B-1728B52AA6E4}">
+                <adec:decorative xmlns:adec="http://schemas.microsoft.com/office/drawing/2017/decorative" val="1"/>
               </a:ext>
             </a:extLst>
           </p:cNvPr>
           <p:cNvSpPr>
-            <a:spLocks noGrp="1"/>
-          </p:cNvSpPr>
-          <p:nvPr>
-            <p:ph idx="1"/>
-          </p:nvPr>
-        </p:nvSpPr>
-        <p:spPr>
-          <a:xfrm>
-            <a:off x="1371600" y="2094407"/>
-            <a:ext cx="9601200" cy="3931923"/>
-          </a:xfrm>
-        </p:spPr>
-        <p:txBody>
-          <a:bodyPr>
-            <a:noAutofit/>
-          </a:bodyPr>
+            <a:spLocks noGrp="1" noRot="1" noChangeAspect="1" noMove="1" noResize="1" noEditPoints="1" noAdjustHandles="1" noChangeArrowheads="1" noChangeShapeType="1" noTextEdit="1"/>
+          </p:cNvSpPr>
+          <p:nvPr>
+            <p:extLst>
+              <p:ext uri="{386F3935-93C4-4BCD-93E2-E3B085C9AB24}">
+                <p16:designElem xmlns:p16="http://schemas.microsoft.com/office/powerpoint/2015/main" val="1"/>
+              </p:ext>
+            </p:extLst>
+          </p:nvPr>
+        </p:nvSpPr>
+        <p:spPr>
+          <a:xfrm>
+            <a:off x="0" y="0"/>
+            <a:ext cx="12192000" cy="6858000"/>
+          </a:xfrm>
+          <a:prstGeom prst="rect">
+            <a:avLst/>
+          </a:prstGeom>
+          <a:solidFill>
+            <a:schemeClr val="bg2"/>
+          </a:solidFill>
+          <a:ln>
+            <a:noFill/>
+          </a:ln>
+        </p:spPr>
+        <p:style>
+          <a:lnRef idx="2">
+            <a:schemeClr val="accent1">
+              <a:shade val="50000"/>
+            </a:schemeClr>
+          </a:lnRef>
+          <a:fillRef idx="1">
+            <a:schemeClr val="accent1"/>
+          </a:fillRef>
+          <a:effectRef idx="0">
+            <a:schemeClr val="accent1"/>
+          </a:effectRef>
+          <a:fontRef idx="minor">
+            <a:schemeClr val="lt1"/>
+          </a:fontRef>
+        </p:style>
+        <p:txBody>
+          <a:bodyPr rtlCol="0" anchor="ctr"/>
           <a:lstStyle/>
           <a:p>
-            <a:pPr>
-              <a:lnSpc>
-                <a:spcPct val="95000"/>
-              </a:lnSpc>
-            </a:pPr>
-            <a:r>
-              <a:rPr lang="cs-CZ" sz="2400" dirty="0"/>
-              <a:t>Seznámit se s WooWoo</a:t>
-            </a:r>
-          </a:p>
-          <a:p>
-            <a:pPr>
-              <a:lnSpc>
-                <a:spcPct val="95000"/>
-              </a:lnSpc>
-            </a:pPr>
-            <a:r>
-              <a:rPr lang="cs-CZ" sz="2400" dirty="0"/>
-              <a:t>Prozkoumat možnosti rozšíření editorů</a:t>
-            </a:r>
-          </a:p>
-          <a:p>
-            <a:pPr>
-              <a:lnSpc>
-                <a:spcPct val="95000"/>
-              </a:lnSpc>
-            </a:pPr>
-            <a:r>
-              <a:rPr lang="cs-CZ" sz="2400" dirty="0"/>
-              <a:t>Navrhnout, implementovat a otestovat rozšíření vybraného editoru pro podporu tvorby WooWoo dokumentů</a:t>
-            </a:r>
-          </a:p>
-          <a:p>
-            <a:pPr>
-              <a:lnSpc>
-                <a:spcPct val="95000"/>
-              </a:lnSpc>
-            </a:pPr>
-            <a:r>
-              <a:rPr lang="cs-CZ" sz="2400" dirty="0"/>
-              <a:t>Prezentace logické struktury dokumentu</a:t>
-            </a:r>
-          </a:p>
-          <a:p>
-            <a:pPr>
-              <a:lnSpc>
-                <a:spcPct val="95000"/>
-              </a:lnSpc>
-            </a:pPr>
-            <a:r>
-              <a:rPr lang="cs-CZ" sz="2400" dirty="0"/>
-              <a:t>Zobrazování matematických výrazů, grafických objektů (</a:t>
-            </a:r>
-            <a:r>
-              <a:rPr lang="cs-CZ" sz="2400" dirty="0" err="1"/>
-              <a:t>TikZ</a:t>
-            </a:r>
-            <a:r>
-              <a:rPr lang="cs-CZ" sz="2400" dirty="0"/>
-              <a:t>)</a:t>
-            </a:r>
-          </a:p>
-          <a:p>
-            <a:pPr>
-              <a:lnSpc>
-                <a:spcPct val="95000"/>
-              </a:lnSpc>
-            </a:pPr>
-            <a:r>
-              <a:rPr lang="cs-CZ" sz="2400" dirty="0"/>
-              <a:t>Navigace v dokumentu (obsah, přehled značek, vyhledávání v nich)</a:t>
-            </a:r>
-          </a:p>
-          <a:p>
-            <a:pPr>
-              <a:lnSpc>
-                <a:spcPct val="95000"/>
-              </a:lnSpc>
-            </a:pPr>
-            <a:r>
-              <a:rPr lang="cs-CZ" sz="2400" dirty="0" err="1"/>
-              <a:t>Multiplatformnost</a:t>
-            </a:r>
-            <a:r>
-              <a:rPr lang="cs-CZ" sz="2400" dirty="0"/>
-              <a:t> a nezávislost na internetovém připojení</a:t>
-            </a:r>
-          </a:p>
-        </p:txBody>
-      </p:sp>
+            <a:pPr algn="ctr"/>
+            <a:endParaRPr lang="en-US"/>
+          </a:p>
+        </p:txBody>
+      </p:sp>
+      <p:sp>
+        <p:nvSpPr>
+          <p:cNvPr id="30" name="Rectangle 29">
+            <a:extLst>
+              <a:ext uri="{FF2B5EF4-FFF2-40B4-BE49-F238E27FC236}">
+                <a16:creationId xmlns:a16="http://schemas.microsoft.com/office/drawing/2014/main" id="{7D49185E-361A-421B-8F2D-11C7FFC686F0}"/>
+              </a:ext>
+              <a:ext uri="{C183D7F6-B498-43B3-948B-1728B52AA6E4}">
+                <adec:decorative xmlns:adec="http://schemas.microsoft.com/office/drawing/2017/decorative" val="1"/>
+              </a:ext>
+            </a:extLst>
+          </p:cNvPr>
+          <p:cNvSpPr>
+            <a:spLocks noGrp="1" noRot="1" noChangeAspect="1" noMove="1" noResize="1" noEditPoints="1" noAdjustHandles="1" noChangeArrowheads="1" noChangeShapeType="1" noTextEdit="1"/>
+          </p:cNvSpPr>
+          <p:nvPr>
+            <p:extLst>
+              <p:ext uri="{386F3935-93C4-4BCD-93E2-E3B085C9AB24}">
+                <p16:designElem xmlns:p16="http://schemas.microsoft.com/office/powerpoint/2015/main" val="1"/>
+              </p:ext>
+            </p:extLst>
+          </p:nvPr>
+        </p:nvSpPr>
+        <p:spPr>
+          <a:xfrm>
+            <a:off x="0" y="0"/>
+            <a:ext cx="365760" cy="365760"/>
+          </a:xfrm>
+          <a:prstGeom prst="rect">
+            <a:avLst/>
+          </a:prstGeom>
+          <a:solidFill>
+            <a:schemeClr val="tx1"/>
+          </a:solidFill>
+          <a:ln>
+            <a:noFill/>
+          </a:ln>
+        </p:spPr>
+        <p:style>
+          <a:lnRef idx="2">
+            <a:schemeClr val="accent1">
+              <a:shade val="50000"/>
+            </a:schemeClr>
+          </a:lnRef>
+          <a:fillRef idx="1">
+            <a:schemeClr val="accent1"/>
+          </a:fillRef>
+          <a:effectRef idx="0">
+            <a:schemeClr val="accent1"/>
+          </a:effectRef>
+          <a:fontRef idx="minor">
+            <a:schemeClr val="lt1"/>
+          </a:fontRef>
+        </p:style>
+        <p:txBody>
+          <a:bodyPr rtlCol="0" anchor="ctr"/>
+          <a:lstStyle/>
+          <a:p>
+            <a:pPr algn="ctr"/>
+            <a:endParaRPr lang="en-US"/>
+          </a:p>
+        </p:txBody>
+      </p:sp>
+      <p:sp>
+        <p:nvSpPr>
+          <p:cNvPr id="32" name="Rectangle 31">
+            <a:extLst>
+              <a:ext uri="{FF2B5EF4-FFF2-40B4-BE49-F238E27FC236}">
+                <a16:creationId xmlns:a16="http://schemas.microsoft.com/office/drawing/2014/main" id="{14B85BAA-C37F-44B4-B427-B4F10EBB4183}"/>
+              </a:ext>
+              <a:ext uri="{C183D7F6-B498-43B3-948B-1728B52AA6E4}">
+                <adec:decorative xmlns:adec="http://schemas.microsoft.com/office/drawing/2017/decorative" val="1"/>
+              </a:ext>
+            </a:extLst>
+          </p:cNvPr>
+          <p:cNvSpPr>
+            <a:spLocks noGrp="1" noRot="1" noChangeAspect="1" noMove="1" noResize="1" noEditPoints="1" noAdjustHandles="1" noChangeArrowheads="1" noChangeShapeType="1" noTextEdit="1"/>
+          </p:cNvSpPr>
+          <p:nvPr>
+            <p:extLst>
+              <p:ext uri="{386F3935-93C4-4BCD-93E2-E3B085C9AB24}">
+                <p16:designElem xmlns:p16="http://schemas.microsoft.com/office/powerpoint/2015/main" val="1"/>
+              </p:ext>
+            </p:extLst>
+          </p:nvPr>
+        </p:nvSpPr>
+        <p:spPr>
+          <a:xfrm>
+            <a:off x="11826240" y="-4668"/>
+            <a:ext cx="365760" cy="365760"/>
+          </a:xfrm>
+          <a:prstGeom prst="rect">
+            <a:avLst/>
+          </a:prstGeom>
+          <a:solidFill>
+            <a:schemeClr val="tx1"/>
+          </a:solidFill>
+          <a:ln>
+            <a:noFill/>
+          </a:ln>
+        </p:spPr>
+        <p:style>
+          <a:lnRef idx="2">
+            <a:schemeClr val="accent1">
+              <a:shade val="50000"/>
+            </a:schemeClr>
+          </a:lnRef>
+          <a:fillRef idx="1">
+            <a:schemeClr val="accent1"/>
+          </a:fillRef>
+          <a:effectRef idx="0">
+            <a:schemeClr val="accent1"/>
+          </a:effectRef>
+          <a:fontRef idx="minor">
+            <a:schemeClr val="lt1"/>
+          </a:fontRef>
+        </p:style>
+        <p:txBody>
+          <a:bodyPr rtlCol="0" anchor="ctr"/>
+          <a:lstStyle/>
+          <a:p>
+            <a:pPr algn="ctr"/>
+            <a:endParaRPr lang="en-US"/>
+          </a:p>
+        </p:txBody>
+      </p:sp>
+      <p:sp>
+        <p:nvSpPr>
+          <p:cNvPr id="34" name="Rectangle 33">
+            <a:extLst>
+              <a:ext uri="{FF2B5EF4-FFF2-40B4-BE49-F238E27FC236}">
+                <a16:creationId xmlns:a16="http://schemas.microsoft.com/office/drawing/2014/main" id="{EDC4EE06-D7B4-4FAC-A561-38A1C380232A}"/>
+              </a:ext>
+              <a:ext uri="{C183D7F6-B498-43B3-948B-1728B52AA6E4}">
+                <adec:decorative xmlns:adec="http://schemas.microsoft.com/office/drawing/2017/decorative" val="1"/>
+              </a:ext>
+            </a:extLst>
+          </p:cNvPr>
+          <p:cNvSpPr>
+            <a:spLocks noGrp="1" noRot="1" noChangeAspect="1" noMove="1" noResize="1" noEditPoints="1" noAdjustHandles="1" noChangeArrowheads="1" noChangeShapeType="1" noTextEdit="1"/>
+          </p:cNvSpPr>
+          <p:nvPr>
+            <p:extLst>
+              <p:ext uri="{386F3935-93C4-4BCD-93E2-E3B085C9AB24}">
+                <p16:designElem xmlns:p16="http://schemas.microsoft.com/office/powerpoint/2015/main" val="1"/>
+              </p:ext>
+            </p:extLst>
+          </p:nvPr>
+        </p:nvSpPr>
+        <p:spPr>
+          <a:xfrm>
+            <a:off x="0" y="6494325"/>
+            <a:ext cx="365760" cy="365760"/>
+          </a:xfrm>
+          <a:prstGeom prst="rect">
+            <a:avLst/>
+          </a:prstGeom>
+          <a:solidFill>
+            <a:schemeClr val="tx1"/>
+          </a:solidFill>
+          <a:ln>
+            <a:noFill/>
+          </a:ln>
+        </p:spPr>
+        <p:style>
+          <a:lnRef idx="2">
+            <a:schemeClr val="accent1">
+              <a:shade val="50000"/>
+            </a:schemeClr>
+          </a:lnRef>
+          <a:fillRef idx="1">
+            <a:schemeClr val="accent1"/>
+          </a:fillRef>
+          <a:effectRef idx="0">
+            <a:schemeClr val="accent1"/>
+          </a:effectRef>
+          <a:fontRef idx="minor">
+            <a:schemeClr val="lt1"/>
+          </a:fontRef>
+        </p:style>
+        <p:txBody>
+          <a:bodyPr rtlCol="0" anchor="ctr"/>
+          <a:lstStyle/>
+          <a:p>
+            <a:pPr algn="ctr"/>
+            <a:endParaRPr lang="en-US"/>
+          </a:p>
+        </p:txBody>
+      </p:sp>
+      <p:sp>
+        <p:nvSpPr>
+          <p:cNvPr id="36" name="Rectangle 35">
+            <a:extLst>
+              <a:ext uri="{FF2B5EF4-FFF2-40B4-BE49-F238E27FC236}">
+                <a16:creationId xmlns:a16="http://schemas.microsoft.com/office/drawing/2014/main" id="{9018D83B-903C-4782-B1BB-A45164A71F60}"/>
+              </a:ext>
+              <a:ext uri="{C183D7F6-B498-43B3-948B-1728B52AA6E4}">
+                <adec:decorative xmlns:adec="http://schemas.microsoft.com/office/drawing/2017/decorative" val="1"/>
+              </a:ext>
+            </a:extLst>
+          </p:cNvPr>
+          <p:cNvSpPr>
+            <a:spLocks noGrp="1" noRot="1" noChangeAspect="1" noMove="1" noResize="1" noEditPoints="1" noAdjustHandles="1" noChangeArrowheads="1" noChangeShapeType="1" noTextEdit="1"/>
+          </p:cNvSpPr>
+          <p:nvPr>
+            <p:extLst>
+              <p:ext uri="{386F3935-93C4-4BCD-93E2-E3B085C9AB24}">
+                <p16:designElem xmlns:p16="http://schemas.microsoft.com/office/powerpoint/2015/main" val="1"/>
+              </p:ext>
+            </p:extLst>
+          </p:nvPr>
+        </p:nvSpPr>
+        <p:spPr>
+          <a:xfrm>
+            <a:off x="11826240" y="6494325"/>
+            <a:ext cx="365760" cy="365760"/>
+          </a:xfrm>
+          <a:prstGeom prst="rect">
+            <a:avLst/>
+          </a:prstGeom>
+          <a:solidFill>
+            <a:schemeClr val="tx1"/>
+          </a:solidFill>
+          <a:ln>
+            <a:noFill/>
+          </a:ln>
+        </p:spPr>
+        <p:style>
+          <a:lnRef idx="2">
+            <a:schemeClr val="accent1">
+              <a:shade val="50000"/>
+            </a:schemeClr>
+          </a:lnRef>
+          <a:fillRef idx="1">
+            <a:schemeClr val="accent1"/>
+          </a:fillRef>
+          <a:effectRef idx="0">
+            <a:schemeClr val="accent1"/>
+          </a:effectRef>
+          <a:fontRef idx="minor">
+            <a:schemeClr val="lt1"/>
+          </a:fontRef>
+        </p:style>
+        <p:txBody>
+          <a:bodyPr rtlCol="0" anchor="ctr"/>
+          <a:lstStyle/>
+          <a:p>
+            <a:pPr algn="ctr"/>
+            <a:endParaRPr lang="en-US"/>
+          </a:p>
+        </p:txBody>
+      </p:sp>
+      <p:sp>
+        <p:nvSpPr>
+          <p:cNvPr id="38" name="Rectangle 37">
+            <a:extLst>
+              <a:ext uri="{FF2B5EF4-FFF2-40B4-BE49-F238E27FC236}">
+                <a16:creationId xmlns:a16="http://schemas.microsoft.com/office/drawing/2014/main" id="{8785589A-A5AC-409A-B2A2-24D871B4CEF0}"/>
+              </a:ext>
+              <a:ext uri="{C183D7F6-B498-43B3-948B-1728B52AA6E4}">
+                <adec:decorative xmlns:adec="http://schemas.microsoft.com/office/drawing/2017/decorative" val="1"/>
+              </a:ext>
+            </a:extLst>
+          </p:cNvPr>
+          <p:cNvSpPr>
+            <a:spLocks noGrp="1" noRot="1" noChangeAspect="1" noMove="1" noResize="1" noEditPoints="1" noAdjustHandles="1" noChangeArrowheads="1" noChangeShapeType="1" noTextEdit="1"/>
+          </p:cNvSpPr>
+          <p:nvPr>
+            <p:extLst>
+              <p:ext uri="{386F3935-93C4-4BCD-93E2-E3B085C9AB24}">
+                <p16:designElem xmlns:p16="http://schemas.microsoft.com/office/powerpoint/2015/main" val="1"/>
+              </p:ext>
+            </p:extLst>
+          </p:nvPr>
+        </p:nvSpPr>
+        <p:spPr>
+          <a:xfrm>
+            <a:off x="160867" y="158782"/>
+            <a:ext cx="11870265" cy="6537850"/>
+          </a:xfrm>
+          <a:prstGeom prst="rect">
+            <a:avLst/>
+          </a:prstGeom>
+          <a:solidFill>
+            <a:srgbClr val="FFFFFF"/>
+          </a:solidFill>
+          <a:ln>
+            <a:noFill/>
+          </a:ln>
+        </p:spPr>
+        <p:style>
+          <a:lnRef idx="2">
+            <a:schemeClr val="accent1">
+              <a:shade val="50000"/>
+            </a:schemeClr>
+          </a:lnRef>
+          <a:fillRef idx="1">
+            <a:schemeClr val="accent1"/>
+          </a:fillRef>
+          <a:effectRef idx="0">
+            <a:schemeClr val="accent1"/>
+          </a:effectRef>
+          <a:fontRef idx="minor">
+            <a:schemeClr val="lt1"/>
+          </a:fontRef>
+        </p:style>
+        <p:txBody>
+          <a:bodyPr rtlCol="0" anchor="ctr"/>
+          <a:lstStyle/>
+          <a:p>
+            <a:pPr algn="ctr"/>
+            <a:endParaRPr lang="en-US"/>
+          </a:p>
+        </p:txBody>
+      </p:sp>
+      <p:pic>
+        <p:nvPicPr>
+          <p:cNvPr id="3" name="Grafický objekt 2">
+            <a:extLst>
+              <a:ext uri="{FF2B5EF4-FFF2-40B4-BE49-F238E27FC236}">
+                <a16:creationId xmlns:a16="http://schemas.microsoft.com/office/drawing/2014/main" id="{481D2F76-1237-4E08-B1DB-5DAC1D65881C}"/>
+              </a:ext>
+            </a:extLst>
+          </p:cNvPr>
+          <p:cNvPicPr>
+            <a:picLocks noChangeAspect="1"/>
+          </p:cNvPicPr>
+          <p:nvPr/>
+        </p:nvPicPr>
+        <p:blipFill>
+          <a:blip r:embed="rId2">
+            <a:extLst>
+              <a:ext uri="{96DAC541-7B7A-43D3-8B79-37D633B846F1}">
+                <asvg:svgBlip xmlns:asvg="http://schemas.microsoft.com/office/drawing/2016/SVG/main" r:embed="rId3"/>
+              </a:ext>
+            </a:extLst>
+          </a:blip>
+          <a:stretch>
+            <a:fillRect/>
+          </a:stretch>
+        </p:blipFill>
+        <p:spPr>
+          <a:xfrm>
+            <a:off x="1844404" y="480515"/>
+            <a:ext cx="8503191" cy="5892302"/>
+          </a:xfrm>
+          <a:prstGeom prst="rect">
+            <a:avLst/>
+          </a:prstGeom>
+        </p:spPr>
+      </p:pic>
     </p:spTree>
     <p:extLst>
       <p:ext uri="{BB962C8B-B14F-4D97-AF65-F5344CB8AC3E}">
-        <p14:creationId xmlns:p14="http://schemas.microsoft.com/office/powerpoint/2010/main" val="538099962"/>
+        <p14:creationId xmlns:p14="http://schemas.microsoft.com/office/powerpoint/2010/main" val="2646472029"/>
       </p:ext>
     </p:extLst>
   </p:cSld>
@@ -5243,6 +5687,14 @@
 <file path=ppt/slides/slide4.xml><?xml version="1.0" encoding="utf-8"?>
 <p:sld xmlns:a="http://schemas.openxmlformats.org/drawingml/2006/main" xmlns:r="http://schemas.openxmlformats.org/officeDocument/2006/relationships" xmlns:p="http://schemas.openxmlformats.org/presentationml/2006/main">
   <p:cSld>
+    <p:bg>
+      <p:bgPr>
+        <a:solidFill>
+          <a:schemeClr val="bg2"/>
+        </a:solidFill>
+        <a:effectLst/>
+      </p:bgPr>
+    </p:bg>
     <p:spTree>
       <p:nvGrpSpPr>
         <p:cNvPr id="1" name=""/>
@@ -5259,94 +5711,471 @@
       </p:grpSpPr>
       <p:sp>
         <p:nvSpPr>
-          <p:cNvPr id="2" name="Nadpis 1">
+          <p:cNvPr id="43" name="Rectangle 42">
             <a:extLst>
               <a:ext uri="{FF2B5EF4-FFF2-40B4-BE49-F238E27FC236}">
-                <a16:creationId xmlns:a16="http://schemas.microsoft.com/office/drawing/2014/main" id="{549A5A5D-6404-4273-ABC2-8746AA0BC62C}"/>
+                <a16:creationId xmlns:a16="http://schemas.microsoft.com/office/drawing/2014/main" id="{AA6EC888-B85F-410F-B430-06583E94BEEC}"/>
+              </a:ext>
+              <a:ext uri="{C183D7F6-B498-43B3-948B-1728B52AA6E4}">
+                <adec:decorative xmlns:adec="http://schemas.microsoft.com/office/drawing/2017/decorative" val="1"/>
               </a:ext>
             </a:extLst>
           </p:cNvPr>
           <p:cNvSpPr>
-            <a:spLocks noGrp="1"/>
-          </p:cNvSpPr>
-          <p:nvPr>
-            <p:ph type="title"/>
-          </p:nvPr>
-        </p:nvSpPr>
-        <p:spPr>
-          <a:xfrm>
-            <a:off x="1371600" y="703218"/>
-            <a:ext cx="9601200" cy="1485900"/>
-          </a:xfrm>
-        </p:spPr>
-        <p:txBody>
-          <a:bodyPr>
-            <a:normAutofit/>
-          </a:bodyPr>
-          <a:lstStyle/>
-          <a:p>
-            <a:r>
-              <a:rPr lang="cs-CZ" sz="5400" dirty="0"/>
-              <a:t>Motivace</a:t>
-            </a:r>
-          </a:p>
-        </p:txBody>
-      </p:sp>
-      <p:sp>
-        <p:nvSpPr>
-          <p:cNvPr id="3" name="Zástupný obsah 2">
+            <a:spLocks noGrp="1" noRot="1" noChangeAspect="1" noMove="1" noResize="1" noEditPoints="1" noAdjustHandles="1" noChangeArrowheads="1" noChangeShapeType="1" noTextEdit="1"/>
+          </p:cNvSpPr>
+          <p:nvPr>
+            <p:extLst>
+              <p:ext uri="{386F3935-93C4-4BCD-93E2-E3B085C9AB24}">
+                <p16:designElem xmlns:p16="http://schemas.microsoft.com/office/powerpoint/2015/main" val="1"/>
+              </p:ext>
+            </p:extLst>
+          </p:nvPr>
+        </p:nvSpPr>
+        <p:spPr>
+          <a:xfrm>
+            <a:off x="478095" y="376"/>
+            <a:ext cx="228600" cy="6858000"/>
+          </a:xfrm>
+          <a:prstGeom prst="rect">
+            <a:avLst/>
+          </a:prstGeom>
+          <a:solidFill>
+            <a:schemeClr val="tx2"/>
+          </a:solidFill>
+          <a:ln>
+            <a:noFill/>
+          </a:ln>
+        </p:spPr>
+        <p:style>
+          <a:lnRef idx="2">
+            <a:schemeClr val="accent1">
+              <a:shade val="50000"/>
+            </a:schemeClr>
+          </a:lnRef>
+          <a:fillRef idx="1">
+            <a:schemeClr val="accent1"/>
+          </a:fillRef>
+          <a:effectRef idx="0">
+            <a:schemeClr val="accent1"/>
+          </a:effectRef>
+          <a:fontRef idx="minor">
+            <a:schemeClr val="lt1"/>
+          </a:fontRef>
+        </p:style>
+      </p:sp>
+      <p:sp>
+        <p:nvSpPr>
+          <p:cNvPr id="45" name="Rectangle 44">
             <a:extLst>
               <a:ext uri="{FF2B5EF4-FFF2-40B4-BE49-F238E27FC236}">
-                <a16:creationId xmlns:a16="http://schemas.microsoft.com/office/drawing/2014/main" id="{1EDB8F96-D142-46B1-9AEA-ABE2773ED79C}"/>
+                <a16:creationId xmlns:a16="http://schemas.microsoft.com/office/drawing/2014/main" id="{9485DA84-CB73-4E5E-9864-2460CE28055D}"/>
+              </a:ext>
+              <a:ext uri="{C183D7F6-B498-43B3-948B-1728B52AA6E4}">
+                <adec:decorative xmlns:adec="http://schemas.microsoft.com/office/drawing/2017/decorative" val="1"/>
               </a:ext>
             </a:extLst>
           </p:cNvPr>
           <p:cNvSpPr>
-            <a:spLocks noGrp="1"/>
-          </p:cNvSpPr>
-          <p:nvPr>
-            <p:ph idx="1"/>
-          </p:nvPr>
-        </p:nvSpPr>
-        <p:spPr>
-          <a:xfrm>
-            <a:off x="1371600" y="2094407"/>
-            <a:ext cx="9601200" cy="3931923"/>
-          </a:xfrm>
-        </p:spPr>
-        <p:txBody>
-          <a:bodyPr>
-            <a:noAutofit/>
-          </a:bodyPr>
+            <a:spLocks noGrp="1" noRot="1" noChangeAspect="1" noMove="1" noResize="1" noEditPoints="1" noAdjustHandles="1" noChangeArrowheads="1" noChangeShapeType="1" noTextEdit="1"/>
+          </p:cNvSpPr>
+          <p:nvPr>
+            <p:extLst>
+              <p:ext uri="{386F3935-93C4-4BCD-93E2-E3B085C9AB24}">
+                <p16:designElem xmlns:p16="http://schemas.microsoft.com/office/powerpoint/2015/main" val="1"/>
+              </p:ext>
+            </p:extLst>
+          </p:nvPr>
+        </p:nvSpPr>
+        <p:spPr>
+          <a:xfrm>
+            <a:off x="0" y="0"/>
+            <a:ext cx="12192000" cy="6858000"/>
+          </a:xfrm>
+          <a:prstGeom prst="rect">
+            <a:avLst/>
+          </a:prstGeom>
+          <a:solidFill>
+            <a:schemeClr val="bg2"/>
+          </a:solidFill>
+          <a:ln>
+            <a:noFill/>
+          </a:ln>
+        </p:spPr>
+        <p:style>
+          <a:lnRef idx="2">
+            <a:schemeClr val="accent1">
+              <a:shade val="50000"/>
+            </a:schemeClr>
+          </a:lnRef>
+          <a:fillRef idx="1">
+            <a:schemeClr val="accent1"/>
+          </a:fillRef>
+          <a:effectRef idx="0">
+            <a:schemeClr val="accent1"/>
+          </a:effectRef>
+          <a:fontRef idx="minor">
+            <a:schemeClr val="lt1"/>
+          </a:fontRef>
+        </p:style>
+        <p:txBody>
+          <a:bodyPr rtlCol="0" anchor="ctr"/>
           <a:lstStyle/>
           <a:p>
-            <a:pPr>
-              <a:lnSpc>
-                <a:spcPct val="95000"/>
-              </a:lnSpc>
-            </a:pPr>
-            <a:r>
-              <a:rPr lang="cs-CZ" sz="2400" dirty="0"/>
-              <a:t>Zjednodušení tvorby materiálů pro podporu studia</a:t>
-            </a:r>
-          </a:p>
-          <a:p>
-            <a:pPr>
-              <a:lnSpc>
-                <a:spcPct val="95000"/>
-              </a:lnSpc>
-            </a:pPr>
-            <a:r>
-              <a:rPr lang="cs-CZ" sz="2400" dirty="0"/>
-              <a:t>Prozkoumání možností rozšíření moderních editorů</a:t>
-            </a:r>
-          </a:p>
-        </p:txBody>
-      </p:sp>
+            <a:pPr algn="ctr"/>
+            <a:endParaRPr lang="en-US"/>
+          </a:p>
+        </p:txBody>
+      </p:sp>
+      <p:sp>
+        <p:nvSpPr>
+          <p:cNvPr id="47" name="Rectangle 46">
+            <a:extLst>
+              <a:ext uri="{FF2B5EF4-FFF2-40B4-BE49-F238E27FC236}">
+                <a16:creationId xmlns:a16="http://schemas.microsoft.com/office/drawing/2014/main" id="{7D49185E-361A-421B-8F2D-11C7FFC686F0}"/>
+              </a:ext>
+              <a:ext uri="{C183D7F6-B498-43B3-948B-1728B52AA6E4}">
+                <adec:decorative xmlns:adec="http://schemas.microsoft.com/office/drawing/2017/decorative" val="1"/>
+              </a:ext>
+            </a:extLst>
+          </p:cNvPr>
+          <p:cNvSpPr>
+            <a:spLocks noGrp="1" noRot="1" noChangeAspect="1" noMove="1" noResize="1" noEditPoints="1" noAdjustHandles="1" noChangeArrowheads="1" noChangeShapeType="1" noTextEdit="1"/>
+          </p:cNvSpPr>
+          <p:nvPr>
+            <p:extLst>
+              <p:ext uri="{386F3935-93C4-4BCD-93E2-E3B085C9AB24}">
+                <p16:designElem xmlns:p16="http://schemas.microsoft.com/office/powerpoint/2015/main" val="1"/>
+              </p:ext>
+            </p:extLst>
+          </p:nvPr>
+        </p:nvSpPr>
+        <p:spPr>
+          <a:xfrm>
+            <a:off x="0" y="0"/>
+            <a:ext cx="365760" cy="365760"/>
+          </a:xfrm>
+          <a:prstGeom prst="rect">
+            <a:avLst/>
+          </a:prstGeom>
+          <a:solidFill>
+            <a:schemeClr val="tx1"/>
+          </a:solidFill>
+          <a:ln>
+            <a:noFill/>
+          </a:ln>
+        </p:spPr>
+        <p:style>
+          <a:lnRef idx="2">
+            <a:schemeClr val="accent1">
+              <a:shade val="50000"/>
+            </a:schemeClr>
+          </a:lnRef>
+          <a:fillRef idx="1">
+            <a:schemeClr val="accent1"/>
+          </a:fillRef>
+          <a:effectRef idx="0">
+            <a:schemeClr val="accent1"/>
+          </a:effectRef>
+          <a:fontRef idx="minor">
+            <a:schemeClr val="lt1"/>
+          </a:fontRef>
+        </p:style>
+        <p:txBody>
+          <a:bodyPr rtlCol="0" anchor="ctr"/>
+          <a:lstStyle/>
+          <a:p>
+            <a:pPr algn="ctr"/>
+            <a:endParaRPr lang="en-US"/>
+          </a:p>
+        </p:txBody>
+      </p:sp>
+      <p:sp>
+        <p:nvSpPr>
+          <p:cNvPr id="49" name="Rectangle 48">
+            <a:extLst>
+              <a:ext uri="{FF2B5EF4-FFF2-40B4-BE49-F238E27FC236}">
+                <a16:creationId xmlns:a16="http://schemas.microsoft.com/office/drawing/2014/main" id="{14B85BAA-C37F-44B4-B427-B4F10EBB4183}"/>
+              </a:ext>
+              <a:ext uri="{C183D7F6-B498-43B3-948B-1728B52AA6E4}">
+                <adec:decorative xmlns:adec="http://schemas.microsoft.com/office/drawing/2017/decorative" val="1"/>
+              </a:ext>
+            </a:extLst>
+          </p:cNvPr>
+          <p:cNvSpPr>
+            <a:spLocks noGrp="1" noRot="1" noChangeAspect="1" noMove="1" noResize="1" noEditPoints="1" noAdjustHandles="1" noChangeArrowheads="1" noChangeShapeType="1" noTextEdit="1"/>
+          </p:cNvSpPr>
+          <p:nvPr>
+            <p:extLst>
+              <p:ext uri="{386F3935-93C4-4BCD-93E2-E3B085C9AB24}">
+                <p16:designElem xmlns:p16="http://schemas.microsoft.com/office/powerpoint/2015/main" val="1"/>
+              </p:ext>
+            </p:extLst>
+          </p:nvPr>
+        </p:nvSpPr>
+        <p:spPr>
+          <a:xfrm>
+            <a:off x="11826240" y="-4668"/>
+            <a:ext cx="365760" cy="365760"/>
+          </a:xfrm>
+          <a:prstGeom prst="rect">
+            <a:avLst/>
+          </a:prstGeom>
+          <a:solidFill>
+            <a:schemeClr val="tx1"/>
+          </a:solidFill>
+          <a:ln>
+            <a:noFill/>
+          </a:ln>
+        </p:spPr>
+        <p:style>
+          <a:lnRef idx="2">
+            <a:schemeClr val="accent1">
+              <a:shade val="50000"/>
+            </a:schemeClr>
+          </a:lnRef>
+          <a:fillRef idx="1">
+            <a:schemeClr val="accent1"/>
+          </a:fillRef>
+          <a:effectRef idx="0">
+            <a:schemeClr val="accent1"/>
+          </a:effectRef>
+          <a:fontRef idx="minor">
+            <a:schemeClr val="lt1"/>
+          </a:fontRef>
+        </p:style>
+        <p:txBody>
+          <a:bodyPr rtlCol="0" anchor="ctr"/>
+          <a:lstStyle/>
+          <a:p>
+            <a:pPr algn="ctr"/>
+            <a:endParaRPr lang="en-US"/>
+          </a:p>
+        </p:txBody>
+      </p:sp>
+      <p:sp>
+        <p:nvSpPr>
+          <p:cNvPr id="51" name="Rectangle 50">
+            <a:extLst>
+              <a:ext uri="{FF2B5EF4-FFF2-40B4-BE49-F238E27FC236}">
+                <a16:creationId xmlns:a16="http://schemas.microsoft.com/office/drawing/2014/main" id="{EDC4EE06-D7B4-4FAC-A561-38A1C380232A}"/>
+              </a:ext>
+              <a:ext uri="{C183D7F6-B498-43B3-948B-1728B52AA6E4}">
+                <adec:decorative xmlns:adec="http://schemas.microsoft.com/office/drawing/2017/decorative" val="1"/>
+              </a:ext>
+            </a:extLst>
+          </p:cNvPr>
+          <p:cNvSpPr>
+            <a:spLocks noGrp="1" noRot="1" noChangeAspect="1" noMove="1" noResize="1" noEditPoints="1" noAdjustHandles="1" noChangeArrowheads="1" noChangeShapeType="1" noTextEdit="1"/>
+          </p:cNvSpPr>
+          <p:nvPr>
+            <p:extLst>
+              <p:ext uri="{386F3935-93C4-4BCD-93E2-E3B085C9AB24}">
+                <p16:designElem xmlns:p16="http://schemas.microsoft.com/office/powerpoint/2015/main" val="1"/>
+              </p:ext>
+            </p:extLst>
+          </p:nvPr>
+        </p:nvSpPr>
+        <p:spPr>
+          <a:xfrm>
+            <a:off x="0" y="6494325"/>
+            <a:ext cx="365760" cy="365760"/>
+          </a:xfrm>
+          <a:prstGeom prst="rect">
+            <a:avLst/>
+          </a:prstGeom>
+          <a:solidFill>
+            <a:schemeClr val="tx1"/>
+          </a:solidFill>
+          <a:ln>
+            <a:noFill/>
+          </a:ln>
+        </p:spPr>
+        <p:style>
+          <a:lnRef idx="2">
+            <a:schemeClr val="accent1">
+              <a:shade val="50000"/>
+            </a:schemeClr>
+          </a:lnRef>
+          <a:fillRef idx="1">
+            <a:schemeClr val="accent1"/>
+          </a:fillRef>
+          <a:effectRef idx="0">
+            <a:schemeClr val="accent1"/>
+          </a:effectRef>
+          <a:fontRef idx="minor">
+            <a:schemeClr val="lt1"/>
+          </a:fontRef>
+        </p:style>
+        <p:txBody>
+          <a:bodyPr rtlCol="0" anchor="ctr"/>
+          <a:lstStyle/>
+          <a:p>
+            <a:pPr algn="ctr"/>
+            <a:endParaRPr lang="en-US"/>
+          </a:p>
+        </p:txBody>
+      </p:sp>
+      <p:sp>
+        <p:nvSpPr>
+          <p:cNvPr id="53" name="Rectangle 52">
+            <a:extLst>
+              <a:ext uri="{FF2B5EF4-FFF2-40B4-BE49-F238E27FC236}">
+                <a16:creationId xmlns:a16="http://schemas.microsoft.com/office/drawing/2014/main" id="{9018D83B-903C-4782-B1BB-A45164A71F60}"/>
+              </a:ext>
+              <a:ext uri="{C183D7F6-B498-43B3-948B-1728B52AA6E4}">
+                <adec:decorative xmlns:adec="http://schemas.microsoft.com/office/drawing/2017/decorative" val="1"/>
+              </a:ext>
+            </a:extLst>
+          </p:cNvPr>
+          <p:cNvSpPr>
+            <a:spLocks noGrp="1" noRot="1" noChangeAspect="1" noMove="1" noResize="1" noEditPoints="1" noAdjustHandles="1" noChangeArrowheads="1" noChangeShapeType="1" noTextEdit="1"/>
+          </p:cNvSpPr>
+          <p:nvPr>
+            <p:extLst>
+              <p:ext uri="{386F3935-93C4-4BCD-93E2-E3B085C9AB24}">
+                <p16:designElem xmlns:p16="http://schemas.microsoft.com/office/powerpoint/2015/main" val="1"/>
+              </p:ext>
+            </p:extLst>
+          </p:nvPr>
+        </p:nvSpPr>
+        <p:spPr>
+          <a:xfrm>
+            <a:off x="11826240" y="6494325"/>
+            <a:ext cx="365760" cy="365760"/>
+          </a:xfrm>
+          <a:prstGeom prst="rect">
+            <a:avLst/>
+          </a:prstGeom>
+          <a:solidFill>
+            <a:schemeClr val="tx1"/>
+          </a:solidFill>
+          <a:ln>
+            <a:noFill/>
+          </a:ln>
+        </p:spPr>
+        <p:style>
+          <a:lnRef idx="2">
+            <a:schemeClr val="accent1">
+              <a:shade val="50000"/>
+            </a:schemeClr>
+          </a:lnRef>
+          <a:fillRef idx="1">
+            <a:schemeClr val="accent1"/>
+          </a:fillRef>
+          <a:effectRef idx="0">
+            <a:schemeClr val="accent1"/>
+          </a:effectRef>
+          <a:fontRef idx="minor">
+            <a:schemeClr val="lt1"/>
+          </a:fontRef>
+        </p:style>
+        <p:txBody>
+          <a:bodyPr rtlCol="0" anchor="ctr"/>
+          <a:lstStyle/>
+          <a:p>
+            <a:pPr algn="ctr"/>
+            <a:endParaRPr lang="en-US"/>
+          </a:p>
+        </p:txBody>
+      </p:sp>
+      <p:sp>
+        <p:nvSpPr>
+          <p:cNvPr id="55" name="Rectangle 54">
+            <a:extLst>
+              <a:ext uri="{FF2B5EF4-FFF2-40B4-BE49-F238E27FC236}">
+                <a16:creationId xmlns:a16="http://schemas.microsoft.com/office/drawing/2014/main" id="{8785589A-A5AC-409A-B2A2-24D871B4CEF0}"/>
+              </a:ext>
+              <a:ext uri="{C183D7F6-B498-43B3-948B-1728B52AA6E4}">
+                <adec:decorative xmlns:adec="http://schemas.microsoft.com/office/drawing/2017/decorative" val="1"/>
+              </a:ext>
+            </a:extLst>
+          </p:cNvPr>
+          <p:cNvSpPr>
+            <a:spLocks noGrp="1" noRot="1" noChangeAspect="1" noMove="1" noResize="1" noEditPoints="1" noAdjustHandles="1" noChangeArrowheads="1" noChangeShapeType="1" noTextEdit="1"/>
+          </p:cNvSpPr>
+          <p:nvPr>
+            <p:extLst>
+              <p:ext uri="{386F3935-93C4-4BCD-93E2-E3B085C9AB24}">
+                <p16:designElem xmlns:p16="http://schemas.microsoft.com/office/powerpoint/2015/main" val="1"/>
+              </p:ext>
+            </p:extLst>
+          </p:nvPr>
+        </p:nvSpPr>
+        <p:spPr>
+          <a:xfrm>
+            <a:off x="160867" y="158782"/>
+            <a:ext cx="11870265" cy="6537850"/>
+          </a:xfrm>
+          <a:prstGeom prst="rect">
+            <a:avLst/>
+          </a:prstGeom>
+          <a:solidFill>
+            <a:srgbClr val="FFFFFF"/>
+          </a:solidFill>
+          <a:ln>
+            <a:noFill/>
+          </a:ln>
+        </p:spPr>
+        <p:style>
+          <a:lnRef idx="2">
+            <a:schemeClr val="accent1">
+              <a:shade val="50000"/>
+            </a:schemeClr>
+          </a:lnRef>
+          <a:fillRef idx="1">
+            <a:schemeClr val="accent1"/>
+          </a:fillRef>
+          <a:effectRef idx="0">
+            <a:schemeClr val="accent1"/>
+          </a:effectRef>
+          <a:fontRef idx="minor">
+            <a:schemeClr val="lt1"/>
+          </a:fontRef>
+        </p:style>
+        <p:txBody>
+          <a:bodyPr rtlCol="0" anchor="ctr"/>
+          <a:lstStyle/>
+          <a:p>
+            <a:pPr algn="ctr"/>
+            <a:endParaRPr lang="en-US"/>
+          </a:p>
+        </p:txBody>
+      </p:sp>
+      <p:pic>
+        <p:nvPicPr>
+          <p:cNvPr id="4" name="Obrázek 3" descr="Obsah obrázku text&#10;&#10;Popis byl vytvořen automaticky">
+            <a:extLst>
+              <a:ext uri="{FF2B5EF4-FFF2-40B4-BE49-F238E27FC236}">
+                <a16:creationId xmlns:a16="http://schemas.microsoft.com/office/drawing/2014/main" id="{E1954E7B-8D79-40A0-A09B-1A1A8382EDD0}"/>
+              </a:ext>
+            </a:extLst>
+          </p:cNvPr>
+          <p:cNvPicPr>
+            <a:picLocks noChangeAspect="1"/>
+          </p:cNvPicPr>
+          <p:nvPr/>
+        </p:nvPicPr>
+        <p:blipFill>
+          <a:blip r:embed="rId2"/>
+          <a:stretch>
+            <a:fillRect/>
+          </a:stretch>
+        </p:blipFill>
+        <p:spPr>
+          <a:xfrm>
+            <a:off x="482600" y="577866"/>
+            <a:ext cx="11226799" cy="5697600"/>
+          </a:xfrm>
+          <a:prstGeom prst="rect">
+            <a:avLst/>
+          </a:prstGeom>
+        </p:spPr>
+      </p:pic>
     </p:spTree>
     <p:extLst>
       <p:ext uri="{BB962C8B-B14F-4D97-AF65-F5344CB8AC3E}">
-        <p14:creationId xmlns:p14="http://schemas.microsoft.com/office/powerpoint/2010/main" val="2412765517"/>
+        <p14:creationId xmlns:p14="http://schemas.microsoft.com/office/powerpoint/2010/main" val="3388835914"/>
       </p:ext>
     </p:extLst>
   </p:cSld>
@@ -5403,7 +6232,7 @@
           <a:p>
             <a:r>
               <a:rPr lang="cs-CZ" sz="5400" dirty="0"/>
-              <a:t>Současný stav</a:t>
+              <a:t>Cíle</a:t>
             </a:r>
           </a:p>
         </p:txBody>
@@ -5443,7 +6272,7 @@
             </a:pPr>
             <a:r>
               <a:rPr lang="cs-CZ" sz="2400" dirty="0"/>
-              <a:t>Jediná forma zpětné vazby po vygenerování výstupů (pomalé)</a:t>
+              <a:t>Seznámit se s WooWoo</a:t>
             </a:r>
           </a:p>
           <a:p>
@@ -5454,7 +6283,7 @@
             </a:pPr>
             <a:r>
               <a:rPr lang="cs-CZ" sz="2400" dirty="0"/>
-              <a:t>Editor Atom ze zkoumaných editorů umožňuje největší míru modifikací</a:t>
+              <a:t>Prozkoumat možnosti rozšíření editorů</a:t>
             </a:r>
           </a:p>
           <a:p>
@@ -5465,15 +6294,63 @@
             </a:pPr>
             <a:r>
               <a:rPr lang="cs-CZ" sz="2400" dirty="0"/>
-              <a:t>Knihovna </a:t>
+              <a:t>Navrhnout, implementovat a otestovat rozšíření vybraného editoru pro podporu tvorby WooWoo dokumentů</a:t>
+            </a:r>
+          </a:p>
+          <a:p>
+            <a:pPr>
+              <a:lnSpc>
+                <a:spcPct val="95000"/>
+              </a:lnSpc>
+            </a:pPr>
+            <a:r>
+              <a:rPr lang="cs-CZ" sz="2400" dirty="0"/>
+              <a:t>Prezentace logické struktury dokumentu</a:t>
+            </a:r>
+          </a:p>
+          <a:p>
+            <a:pPr>
+              <a:lnSpc>
+                <a:spcPct val="95000"/>
+              </a:lnSpc>
+            </a:pPr>
+            <a:r>
+              <a:rPr lang="cs-CZ" sz="2400" dirty="0"/>
+              <a:t>Zobrazování matematických výrazů, grafických objektů (</a:t>
             </a:r>
             <a:r>
               <a:rPr lang="cs-CZ" sz="2400" dirty="0" err="1"/>
-              <a:t>MathJax</a:t>
+              <a:t>TikZ</a:t>
             </a:r>
             <a:r>
               <a:rPr lang="cs-CZ" sz="2400" dirty="0"/>
-              <a:t> umožňuje kvalitní sazbu matematických výrazů</a:t>
+              <a:t>)</a:t>
+            </a:r>
+          </a:p>
+          <a:p>
+            <a:pPr>
+              <a:lnSpc>
+                <a:spcPct val="95000"/>
+              </a:lnSpc>
+            </a:pPr>
+            <a:r>
+              <a:rPr lang="cs-CZ" sz="2400" dirty="0"/>
+              <a:t>Navigace v dokumentu (obsah, přehled značek, vyhledávání v nich)</a:t>
+            </a:r>
+          </a:p>
+          <a:p>
+            <a:pPr>
+              <a:lnSpc>
+                <a:spcPct val="95000"/>
+              </a:lnSpc>
+            </a:pPr>
+            <a:r>
+              <a:rPr lang="cs-CZ" sz="2400" dirty="0" err="1"/>
+              <a:t>Multiplatformnost</a:t>
+            </a:r>
+            <a:r>
+              <a:rPr lang="cs-CZ" sz="2400" dirty="0"/>
+              <a:t> a nezávislost na internetovém připojení</a:t>
             </a:r>
           </a:p>
         </p:txBody>
@@ -5481,7 +6358,7 @@
     </p:spTree>
     <p:extLst>
       <p:ext uri="{BB962C8B-B14F-4D97-AF65-F5344CB8AC3E}">
-        <p14:creationId xmlns:p14="http://schemas.microsoft.com/office/powerpoint/2010/main" val="1780065603"/>
+        <p14:creationId xmlns:p14="http://schemas.microsoft.com/office/powerpoint/2010/main" val="538099962"/>
       </p:ext>
     </p:extLst>
   </p:cSld>
@@ -5538,7 +6415,7 @@
           <a:p>
             <a:r>
               <a:rPr lang="cs-CZ" sz="5400" dirty="0"/>
-              <a:t>Řešení</a:t>
+              <a:t>Motivace</a:t>
             </a:r>
           </a:p>
         </p:txBody>
@@ -5578,13 +6455,8 @@
             </a:pPr>
             <a:r>
               <a:rPr lang="cs-CZ" sz="2400" dirty="0"/>
-              <a:t>Rozšíření Atomu psané v jazyce </a:t>
-            </a:r>
-            <a:r>
-              <a:rPr lang="cs-CZ" sz="2400" dirty="0" err="1"/>
-              <a:t>TypeScript</a:t>
-            </a:r>
-            <a:endParaRPr lang="cs-CZ" sz="2400" dirty="0"/>
+              <a:t>Zjednodušení tvorby materiálů pro podporu studia</a:t>
+            </a:r>
           </a:p>
           <a:p>
             <a:pPr>
@@ -5594,99 +6466,7 @@
             </a:pPr>
             <a:r>
               <a:rPr lang="cs-CZ" sz="2400" dirty="0"/>
-              <a:t>Zvýrazňování syntaxe s pomocí gramatik ve stylu </a:t>
-            </a:r>
-            <a:r>
-              <a:rPr lang="cs-CZ" sz="2400" dirty="0" err="1"/>
-              <a:t>TextMate</a:t>
-            </a:r>
-            <a:endParaRPr lang="cs-CZ" sz="2400" dirty="0"/>
-          </a:p>
-          <a:p>
-            <a:pPr>
-              <a:lnSpc>
-                <a:spcPct val="95000"/>
-              </a:lnSpc>
-            </a:pPr>
-            <a:r>
-              <a:rPr lang="cs-CZ" sz="2400" dirty="0"/>
-              <a:t>Vytvoření nového </a:t>
-            </a:r>
-            <a:r>
-              <a:rPr lang="cs-CZ" sz="2400" dirty="0" err="1"/>
-              <a:t>parseru</a:t>
-            </a:r>
-            <a:r>
-              <a:rPr lang="cs-CZ" sz="2400" dirty="0"/>
-              <a:t>, který generuje z WooWoo zdroje AST</a:t>
-            </a:r>
-          </a:p>
-          <a:p>
-            <a:pPr>
-              <a:lnSpc>
-                <a:spcPct val="95000"/>
-              </a:lnSpc>
-            </a:pPr>
-            <a:r>
-              <a:rPr lang="cs-CZ" sz="2400" dirty="0"/>
-              <a:t>Překlad AST do HTML</a:t>
-            </a:r>
-          </a:p>
-          <a:p>
-            <a:pPr>
-              <a:lnSpc>
-                <a:spcPct val="95000"/>
-              </a:lnSpc>
-            </a:pPr>
-            <a:r>
-              <a:rPr lang="cs-CZ" sz="2400" dirty="0"/>
-              <a:t>Zobrazení matematických výrazů díky </a:t>
-            </a:r>
-            <a:r>
-              <a:rPr lang="cs-CZ" sz="2400" dirty="0" err="1"/>
-              <a:t>MathJax</a:t>
-            </a:r>
-            <a:r>
-              <a:rPr lang="cs-CZ" sz="2400" dirty="0"/>
-              <a:t> 2.x</a:t>
-            </a:r>
-          </a:p>
-          <a:p>
-            <a:pPr>
-              <a:lnSpc>
-                <a:spcPct val="95000"/>
-              </a:lnSpc>
-            </a:pPr>
-            <a:r>
-              <a:rPr lang="cs-CZ" sz="2400" dirty="0"/>
-              <a:t>Zobrazení </a:t>
-            </a:r>
-            <a:r>
-              <a:rPr lang="cs-CZ" sz="2400" dirty="0" err="1"/>
-              <a:t>TikZ</a:t>
-            </a:r>
-            <a:r>
-              <a:rPr lang="cs-CZ" sz="2400" dirty="0"/>
-              <a:t> obrázků díky nativní instalaci </a:t>
-            </a:r>
-            <a:r>
-              <a:rPr lang="cs-CZ" sz="2400" dirty="0" err="1"/>
-              <a:t>TeX</a:t>
-            </a:r>
-            <a:r>
-              <a:rPr lang="cs-CZ" sz="2400" dirty="0"/>
-              <a:t> prostředí</a:t>
-            </a:r>
-          </a:p>
-          <a:p>
-            <a:pPr>
-              <a:lnSpc>
-                <a:spcPct val="95000"/>
-              </a:lnSpc>
-            </a:pPr>
-            <a:r>
-              <a:rPr lang="cs-CZ" sz="2400" dirty="0"/>
-              <a:t>Navigace s využitím fuzzy vyhledávání</a:t>
+              <a:t>Prozkoumání možností rozšíření moderních editorů</a:t>
             </a:r>
           </a:p>
         </p:txBody>
@@ -5694,7 +6474,7 @@
     </p:spTree>
     <p:extLst>
       <p:ext uri="{BB962C8B-B14F-4D97-AF65-F5344CB8AC3E}">
-        <p14:creationId xmlns:p14="http://schemas.microsoft.com/office/powerpoint/2010/main" val="622366763"/>
+        <p14:creationId xmlns:p14="http://schemas.microsoft.com/office/powerpoint/2010/main" val="2412765517"/>
       </p:ext>
     </p:extLst>
   </p:cSld>
@@ -5707,14 +6487,6 @@
 <file path=ppt/slides/slide7.xml><?xml version="1.0" encoding="utf-8"?>
 <p:sld xmlns:a="http://schemas.openxmlformats.org/drawingml/2006/main" xmlns:r="http://schemas.openxmlformats.org/officeDocument/2006/relationships" xmlns:p="http://schemas.openxmlformats.org/presentationml/2006/main">
   <p:cSld>
-    <p:bg>
-      <p:bgPr>
-        <a:solidFill>
-          <a:schemeClr val="bg2"/>
-        </a:solidFill>
-        <a:effectLst/>
-      </p:bgPr>
-    </p:bg>
     <p:spTree>
       <p:nvGrpSpPr>
         <p:cNvPr id="1" name=""/>
@@ -5731,477 +6503,188 @@
       </p:grpSpPr>
       <p:sp>
         <p:nvSpPr>
-          <p:cNvPr id="9" name="Rectangle 8">
+          <p:cNvPr id="2" name="Nadpis 1">
             <a:extLst>
               <a:ext uri="{FF2B5EF4-FFF2-40B4-BE49-F238E27FC236}">
-                <a16:creationId xmlns:a16="http://schemas.microsoft.com/office/drawing/2014/main" id="{AA6EC888-B85F-410F-B430-06583E94BEEC}"/>
-              </a:ext>
-              <a:ext uri="{C183D7F6-B498-43B3-948B-1728B52AA6E4}">
-                <adec:decorative xmlns:adec="http://schemas.microsoft.com/office/drawing/2017/decorative" val="1"/>
+                <a16:creationId xmlns:a16="http://schemas.microsoft.com/office/drawing/2014/main" id="{549A5A5D-6404-4273-ABC2-8746AA0BC62C}"/>
               </a:ext>
             </a:extLst>
           </p:cNvPr>
           <p:cNvSpPr>
-            <a:spLocks noGrp="1" noRot="1" noChangeAspect="1" noMove="1" noResize="1" noEditPoints="1" noAdjustHandles="1" noChangeArrowheads="1" noChangeShapeType="1" noTextEdit="1"/>
-          </p:cNvSpPr>
-          <p:nvPr>
-            <p:extLst>
-              <p:ext uri="{386F3935-93C4-4BCD-93E2-E3B085C9AB24}">
-                <p16:designElem xmlns:p16="http://schemas.microsoft.com/office/powerpoint/2015/main" val="1"/>
-              </p:ext>
-            </p:extLst>
-          </p:nvPr>
-        </p:nvSpPr>
-        <p:spPr>
-          <a:xfrm>
-            <a:off x="478095" y="376"/>
-            <a:ext cx="228600" cy="6858000"/>
-          </a:xfrm>
-          <a:prstGeom prst="rect">
-            <a:avLst/>
-          </a:prstGeom>
-          <a:solidFill>
-            <a:schemeClr val="tx2"/>
-          </a:solidFill>
-          <a:ln>
-            <a:noFill/>
-          </a:ln>
-        </p:spPr>
-        <p:style>
-          <a:lnRef idx="2">
-            <a:schemeClr val="accent1">
-              <a:shade val="50000"/>
-            </a:schemeClr>
-          </a:lnRef>
-          <a:fillRef idx="1">
-            <a:schemeClr val="accent1"/>
-          </a:fillRef>
-          <a:effectRef idx="0">
-            <a:schemeClr val="accent1"/>
-          </a:effectRef>
-          <a:fontRef idx="minor">
-            <a:schemeClr val="lt1"/>
-          </a:fontRef>
-        </p:style>
-      </p:sp>
-      <p:sp>
-        <p:nvSpPr>
-          <p:cNvPr id="11" name="Rectangle 10">
+            <a:spLocks noGrp="1"/>
+          </p:cNvSpPr>
+          <p:nvPr>
+            <p:ph type="title"/>
+          </p:nvPr>
+        </p:nvSpPr>
+        <p:spPr>
+          <a:xfrm>
+            <a:off x="1371600" y="703218"/>
+            <a:ext cx="9601200" cy="1485900"/>
+          </a:xfrm>
+        </p:spPr>
+        <p:txBody>
+          <a:bodyPr>
+            <a:normAutofit/>
+          </a:bodyPr>
+          <a:lstStyle/>
+          <a:p>
+            <a:r>
+              <a:rPr lang="cs-CZ" sz="5400" dirty="0"/>
+              <a:t>Řešení</a:t>
+            </a:r>
+          </a:p>
+        </p:txBody>
+      </p:sp>
+      <p:sp>
+        <p:nvSpPr>
+          <p:cNvPr id="3" name="Zástupný obsah 2">
             <a:extLst>
               <a:ext uri="{FF2B5EF4-FFF2-40B4-BE49-F238E27FC236}">
-                <a16:creationId xmlns:a16="http://schemas.microsoft.com/office/drawing/2014/main" id="{9485DA84-CB73-4E5E-9864-2460CE28055D}"/>
-              </a:ext>
-              <a:ext uri="{C183D7F6-B498-43B3-948B-1728B52AA6E4}">
-                <adec:decorative xmlns:adec="http://schemas.microsoft.com/office/drawing/2017/decorative" val="1"/>
+                <a16:creationId xmlns:a16="http://schemas.microsoft.com/office/drawing/2014/main" id="{1EDB8F96-D142-46B1-9AEA-ABE2773ED79C}"/>
               </a:ext>
             </a:extLst>
           </p:cNvPr>
           <p:cNvSpPr>
-            <a:spLocks noGrp="1" noRot="1" noChangeAspect="1" noMove="1" noResize="1" noEditPoints="1" noAdjustHandles="1" noChangeArrowheads="1" noChangeShapeType="1" noTextEdit="1"/>
-          </p:cNvSpPr>
-          <p:nvPr>
-            <p:extLst>
-              <p:ext uri="{386F3935-93C4-4BCD-93E2-E3B085C9AB24}">
-                <p16:designElem xmlns:p16="http://schemas.microsoft.com/office/powerpoint/2015/main" val="1"/>
-              </p:ext>
-            </p:extLst>
-          </p:nvPr>
-        </p:nvSpPr>
-        <p:spPr>
-          <a:xfrm>
-            <a:off x="0" y="0"/>
-            <a:ext cx="12192000" cy="6858000"/>
-          </a:xfrm>
-          <a:prstGeom prst="rect">
-            <a:avLst/>
-          </a:prstGeom>
-          <a:solidFill>
-            <a:schemeClr val="bg2"/>
-          </a:solidFill>
-          <a:ln>
-            <a:noFill/>
-          </a:ln>
-        </p:spPr>
-        <p:style>
-          <a:lnRef idx="2">
-            <a:schemeClr val="accent1">
-              <a:shade val="50000"/>
-            </a:schemeClr>
-          </a:lnRef>
-          <a:fillRef idx="1">
-            <a:schemeClr val="accent1"/>
-          </a:fillRef>
-          <a:effectRef idx="0">
-            <a:schemeClr val="accent1"/>
-          </a:effectRef>
-          <a:fontRef idx="minor">
-            <a:schemeClr val="lt1"/>
-          </a:fontRef>
-        </p:style>
-        <p:txBody>
-          <a:bodyPr rtlCol="0" anchor="ctr"/>
+            <a:spLocks noGrp="1"/>
+          </p:cNvSpPr>
+          <p:nvPr>
+            <p:ph idx="1"/>
+          </p:nvPr>
+        </p:nvSpPr>
+        <p:spPr>
+          <a:xfrm>
+            <a:off x="1371600" y="2094407"/>
+            <a:ext cx="9601200" cy="3931923"/>
+          </a:xfrm>
+        </p:spPr>
+        <p:txBody>
+          <a:bodyPr>
+            <a:noAutofit/>
+          </a:bodyPr>
           <a:lstStyle/>
           <a:p>
-            <a:pPr algn="ctr"/>
-            <a:endParaRPr lang="en-US"/>
-          </a:p>
-        </p:txBody>
-      </p:sp>
-      <p:sp>
-        <p:nvSpPr>
-          <p:cNvPr id="13" name="Rectangle 12">
-            <a:extLst>
-              <a:ext uri="{FF2B5EF4-FFF2-40B4-BE49-F238E27FC236}">
-                <a16:creationId xmlns:a16="http://schemas.microsoft.com/office/drawing/2014/main" id="{7D49185E-361A-421B-8F2D-11C7FFC686F0}"/>
-              </a:ext>
-              <a:ext uri="{C183D7F6-B498-43B3-948B-1728B52AA6E4}">
-                <adec:decorative xmlns:adec="http://schemas.microsoft.com/office/drawing/2017/decorative" val="1"/>
-              </a:ext>
-            </a:extLst>
-          </p:cNvPr>
-          <p:cNvSpPr>
-            <a:spLocks noGrp="1" noRot="1" noChangeAspect="1" noMove="1" noResize="1" noEditPoints="1" noAdjustHandles="1" noChangeArrowheads="1" noChangeShapeType="1" noTextEdit="1"/>
-          </p:cNvSpPr>
-          <p:nvPr>
-            <p:extLst>
-              <p:ext uri="{386F3935-93C4-4BCD-93E2-E3B085C9AB24}">
-                <p16:designElem xmlns:p16="http://schemas.microsoft.com/office/powerpoint/2015/main" val="1"/>
-              </p:ext>
-            </p:extLst>
-          </p:nvPr>
-        </p:nvSpPr>
-        <p:spPr>
-          <a:xfrm>
-            <a:off x="0" y="0"/>
-            <a:ext cx="365760" cy="365760"/>
-          </a:xfrm>
-          <a:prstGeom prst="rect">
-            <a:avLst/>
-          </a:prstGeom>
-          <a:solidFill>
-            <a:schemeClr val="tx1"/>
-          </a:solidFill>
-          <a:ln>
-            <a:noFill/>
-          </a:ln>
-        </p:spPr>
-        <p:style>
-          <a:lnRef idx="2">
-            <a:schemeClr val="accent1">
-              <a:shade val="50000"/>
-            </a:schemeClr>
-          </a:lnRef>
-          <a:fillRef idx="1">
-            <a:schemeClr val="accent1"/>
-          </a:fillRef>
-          <a:effectRef idx="0">
-            <a:schemeClr val="accent1"/>
-          </a:effectRef>
-          <a:fontRef idx="minor">
-            <a:schemeClr val="lt1"/>
-          </a:fontRef>
-        </p:style>
-        <p:txBody>
-          <a:bodyPr rtlCol="0" anchor="ctr"/>
-          <a:lstStyle/>
-          <a:p>
-            <a:pPr algn="ctr"/>
-            <a:endParaRPr lang="en-US"/>
-          </a:p>
-        </p:txBody>
-      </p:sp>
-      <p:sp>
-        <p:nvSpPr>
-          <p:cNvPr id="15" name="Rectangle 14">
-            <a:extLst>
-              <a:ext uri="{FF2B5EF4-FFF2-40B4-BE49-F238E27FC236}">
-                <a16:creationId xmlns:a16="http://schemas.microsoft.com/office/drawing/2014/main" id="{14B85BAA-C37F-44B4-B427-B4F10EBB4183}"/>
-              </a:ext>
-              <a:ext uri="{C183D7F6-B498-43B3-948B-1728B52AA6E4}">
-                <adec:decorative xmlns:adec="http://schemas.microsoft.com/office/drawing/2017/decorative" val="1"/>
-              </a:ext>
-            </a:extLst>
-          </p:cNvPr>
-          <p:cNvSpPr>
-            <a:spLocks noGrp="1" noRot="1" noChangeAspect="1" noMove="1" noResize="1" noEditPoints="1" noAdjustHandles="1" noChangeArrowheads="1" noChangeShapeType="1" noTextEdit="1"/>
-          </p:cNvSpPr>
-          <p:nvPr>
-            <p:extLst>
-              <p:ext uri="{386F3935-93C4-4BCD-93E2-E3B085C9AB24}">
-                <p16:designElem xmlns:p16="http://schemas.microsoft.com/office/powerpoint/2015/main" val="1"/>
-              </p:ext>
-            </p:extLst>
-          </p:nvPr>
-        </p:nvSpPr>
-        <p:spPr>
-          <a:xfrm>
-            <a:off x="11826240" y="-4668"/>
-            <a:ext cx="365760" cy="365760"/>
-          </a:xfrm>
-          <a:prstGeom prst="rect">
-            <a:avLst/>
-          </a:prstGeom>
-          <a:solidFill>
-            <a:schemeClr val="tx1"/>
-          </a:solidFill>
-          <a:ln>
-            <a:noFill/>
-          </a:ln>
-        </p:spPr>
-        <p:style>
-          <a:lnRef idx="2">
-            <a:schemeClr val="accent1">
-              <a:shade val="50000"/>
-            </a:schemeClr>
-          </a:lnRef>
-          <a:fillRef idx="1">
-            <a:schemeClr val="accent1"/>
-          </a:fillRef>
-          <a:effectRef idx="0">
-            <a:schemeClr val="accent1"/>
-          </a:effectRef>
-          <a:fontRef idx="minor">
-            <a:schemeClr val="lt1"/>
-          </a:fontRef>
-        </p:style>
-        <p:txBody>
-          <a:bodyPr rtlCol="0" anchor="ctr"/>
-          <a:lstStyle/>
-          <a:p>
-            <a:pPr algn="ctr"/>
-            <a:endParaRPr lang="en-US"/>
-          </a:p>
-        </p:txBody>
-      </p:sp>
-      <p:sp>
-        <p:nvSpPr>
-          <p:cNvPr id="17" name="Rectangle 16">
-            <a:extLst>
-              <a:ext uri="{FF2B5EF4-FFF2-40B4-BE49-F238E27FC236}">
-                <a16:creationId xmlns:a16="http://schemas.microsoft.com/office/drawing/2014/main" id="{EDC4EE06-D7B4-4FAC-A561-38A1C380232A}"/>
-              </a:ext>
-              <a:ext uri="{C183D7F6-B498-43B3-948B-1728B52AA6E4}">
-                <adec:decorative xmlns:adec="http://schemas.microsoft.com/office/drawing/2017/decorative" val="1"/>
-              </a:ext>
-            </a:extLst>
-          </p:cNvPr>
-          <p:cNvSpPr>
-            <a:spLocks noGrp="1" noRot="1" noChangeAspect="1" noMove="1" noResize="1" noEditPoints="1" noAdjustHandles="1" noChangeArrowheads="1" noChangeShapeType="1" noTextEdit="1"/>
-          </p:cNvSpPr>
-          <p:nvPr>
-            <p:extLst>
-              <p:ext uri="{386F3935-93C4-4BCD-93E2-E3B085C9AB24}">
-                <p16:designElem xmlns:p16="http://schemas.microsoft.com/office/powerpoint/2015/main" val="1"/>
-              </p:ext>
-            </p:extLst>
-          </p:nvPr>
-        </p:nvSpPr>
-        <p:spPr>
-          <a:xfrm>
-            <a:off x="0" y="6494325"/>
-            <a:ext cx="365760" cy="365760"/>
-          </a:xfrm>
-          <a:prstGeom prst="rect">
-            <a:avLst/>
-          </a:prstGeom>
-          <a:solidFill>
-            <a:schemeClr val="tx1"/>
-          </a:solidFill>
-          <a:ln>
-            <a:noFill/>
-          </a:ln>
-        </p:spPr>
-        <p:style>
-          <a:lnRef idx="2">
-            <a:schemeClr val="accent1">
-              <a:shade val="50000"/>
-            </a:schemeClr>
-          </a:lnRef>
-          <a:fillRef idx="1">
-            <a:schemeClr val="accent1"/>
-          </a:fillRef>
-          <a:effectRef idx="0">
-            <a:schemeClr val="accent1"/>
-          </a:effectRef>
-          <a:fontRef idx="minor">
-            <a:schemeClr val="lt1"/>
-          </a:fontRef>
-        </p:style>
-        <p:txBody>
-          <a:bodyPr rtlCol="0" anchor="ctr"/>
-          <a:lstStyle/>
-          <a:p>
-            <a:pPr algn="ctr"/>
-            <a:endParaRPr lang="en-US"/>
-          </a:p>
-        </p:txBody>
-      </p:sp>
-      <p:sp>
-        <p:nvSpPr>
-          <p:cNvPr id="19" name="Rectangle 18">
-            <a:extLst>
-              <a:ext uri="{FF2B5EF4-FFF2-40B4-BE49-F238E27FC236}">
-                <a16:creationId xmlns:a16="http://schemas.microsoft.com/office/drawing/2014/main" id="{9018D83B-903C-4782-B1BB-A45164A71F60}"/>
-              </a:ext>
-              <a:ext uri="{C183D7F6-B498-43B3-948B-1728B52AA6E4}">
-                <adec:decorative xmlns:adec="http://schemas.microsoft.com/office/drawing/2017/decorative" val="1"/>
-              </a:ext>
-            </a:extLst>
-          </p:cNvPr>
-          <p:cNvSpPr>
-            <a:spLocks noGrp="1" noRot="1" noChangeAspect="1" noMove="1" noResize="1" noEditPoints="1" noAdjustHandles="1" noChangeArrowheads="1" noChangeShapeType="1" noTextEdit="1"/>
-          </p:cNvSpPr>
-          <p:nvPr>
-            <p:extLst>
-              <p:ext uri="{386F3935-93C4-4BCD-93E2-E3B085C9AB24}">
-                <p16:designElem xmlns:p16="http://schemas.microsoft.com/office/powerpoint/2015/main" val="1"/>
-              </p:ext>
-            </p:extLst>
-          </p:nvPr>
-        </p:nvSpPr>
-        <p:spPr>
-          <a:xfrm>
-            <a:off x="11826240" y="6494325"/>
-            <a:ext cx="365760" cy="365760"/>
-          </a:xfrm>
-          <a:prstGeom prst="rect">
-            <a:avLst/>
-          </a:prstGeom>
-          <a:solidFill>
-            <a:schemeClr val="tx1"/>
-          </a:solidFill>
-          <a:ln>
-            <a:noFill/>
-          </a:ln>
-        </p:spPr>
-        <p:style>
-          <a:lnRef idx="2">
-            <a:schemeClr val="accent1">
-              <a:shade val="50000"/>
-            </a:schemeClr>
-          </a:lnRef>
-          <a:fillRef idx="1">
-            <a:schemeClr val="accent1"/>
-          </a:fillRef>
-          <a:effectRef idx="0">
-            <a:schemeClr val="accent1"/>
-          </a:effectRef>
-          <a:fontRef idx="minor">
-            <a:schemeClr val="lt1"/>
-          </a:fontRef>
-        </p:style>
-        <p:txBody>
-          <a:bodyPr rtlCol="0" anchor="ctr"/>
-          <a:lstStyle/>
-          <a:p>
-            <a:pPr algn="ctr"/>
-            <a:endParaRPr lang="en-US"/>
-          </a:p>
-        </p:txBody>
-      </p:sp>
-      <p:sp>
-        <p:nvSpPr>
-          <p:cNvPr id="21" name="Rectangle 20">
-            <a:extLst>
-              <a:ext uri="{FF2B5EF4-FFF2-40B4-BE49-F238E27FC236}">
-                <a16:creationId xmlns:a16="http://schemas.microsoft.com/office/drawing/2014/main" id="{8785589A-A5AC-409A-B2A2-24D871B4CEF0}"/>
-              </a:ext>
-              <a:ext uri="{C183D7F6-B498-43B3-948B-1728B52AA6E4}">
-                <adec:decorative xmlns:adec="http://schemas.microsoft.com/office/drawing/2017/decorative" val="1"/>
-              </a:ext>
-            </a:extLst>
-          </p:cNvPr>
-          <p:cNvSpPr>
-            <a:spLocks noGrp="1" noRot="1" noChangeAspect="1" noMove="1" noResize="1" noEditPoints="1" noAdjustHandles="1" noChangeArrowheads="1" noChangeShapeType="1" noTextEdit="1"/>
-          </p:cNvSpPr>
-          <p:nvPr>
-            <p:extLst>
-              <p:ext uri="{386F3935-93C4-4BCD-93E2-E3B085C9AB24}">
-                <p16:designElem xmlns:p16="http://schemas.microsoft.com/office/powerpoint/2015/main" val="1"/>
-              </p:ext>
-            </p:extLst>
-          </p:nvPr>
-        </p:nvSpPr>
-        <p:spPr>
-          <a:xfrm>
-            <a:off x="160867" y="158782"/>
-            <a:ext cx="11870265" cy="6537850"/>
-          </a:xfrm>
-          <a:prstGeom prst="rect">
-            <a:avLst/>
-          </a:prstGeom>
-          <a:solidFill>
-            <a:srgbClr val="FFFFFF"/>
-          </a:solidFill>
-          <a:ln>
-            <a:noFill/>
-          </a:ln>
-        </p:spPr>
-        <p:style>
-          <a:lnRef idx="2">
-            <a:schemeClr val="accent1">
-              <a:shade val="50000"/>
-            </a:schemeClr>
-          </a:lnRef>
-          <a:fillRef idx="1">
-            <a:schemeClr val="accent1"/>
-          </a:fillRef>
-          <a:effectRef idx="0">
-            <a:schemeClr val="accent1"/>
-          </a:effectRef>
-          <a:fontRef idx="minor">
-            <a:schemeClr val="lt1"/>
-          </a:fontRef>
-        </p:style>
-        <p:txBody>
-          <a:bodyPr rtlCol="0" anchor="ctr"/>
-          <a:lstStyle/>
-          <a:p>
-            <a:pPr algn="ctr"/>
-            <a:endParaRPr lang="en-US"/>
-          </a:p>
-        </p:txBody>
-      </p:sp>
-      <p:pic>
-        <p:nvPicPr>
-          <p:cNvPr id="4" name="Grafický objekt 3">
-            <a:extLst>
-              <a:ext uri="{FF2B5EF4-FFF2-40B4-BE49-F238E27FC236}">
-                <a16:creationId xmlns:a16="http://schemas.microsoft.com/office/drawing/2014/main" id="{B29402E8-F666-4847-AE39-81ED32D8D3B4}"/>
-              </a:ext>
-            </a:extLst>
-          </p:cNvPr>
-          <p:cNvPicPr>
-            <a:picLocks noChangeAspect="1"/>
-          </p:cNvPicPr>
-          <p:nvPr/>
-        </p:nvPicPr>
-        <p:blipFill>
-          <a:blip r:embed="rId2">
-            <a:extLst>
-              <a:ext uri="{96DAC541-7B7A-43D3-8B79-37D633B846F1}">
-                <asvg:svgBlip xmlns:asvg="http://schemas.microsoft.com/office/drawing/2016/SVG/main" r:embed="rId3"/>
-              </a:ext>
-            </a:extLst>
-          </a:blip>
-          <a:stretch>
-            <a:fillRect/>
-          </a:stretch>
-        </p:blipFill>
-        <p:spPr>
-          <a:xfrm>
-            <a:off x="921350" y="480515"/>
-            <a:ext cx="10349299" cy="5892302"/>
-          </a:xfrm>
-          <a:prstGeom prst="rect">
-            <a:avLst/>
-          </a:prstGeom>
-        </p:spPr>
-      </p:pic>
+            <a:pPr>
+              <a:lnSpc>
+                <a:spcPct val="95000"/>
+              </a:lnSpc>
+            </a:pPr>
+            <a:r>
+              <a:rPr lang="cs-CZ" sz="2400" dirty="0"/>
+              <a:t>Rozšíření Atomu psané v jazyce </a:t>
+            </a:r>
+            <a:r>
+              <a:rPr lang="cs-CZ" sz="2400" dirty="0" err="1"/>
+              <a:t>TypeScript</a:t>
+            </a:r>
+            <a:endParaRPr lang="cs-CZ" sz="2400" dirty="0"/>
+          </a:p>
+          <a:p>
+            <a:pPr>
+              <a:lnSpc>
+                <a:spcPct val="95000"/>
+              </a:lnSpc>
+            </a:pPr>
+            <a:r>
+              <a:rPr lang="cs-CZ" sz="2400" dirty="0"/>
+              <a:t>Zvýrazňování syntaxe s pomocí gramatik ve stylu </a:t>
+            </a:r>
+            <a:r>
+              <a:rPr lang="cs-CZ" sz="2400" dirty="0" err="1"/>
+              <a:t>TextMate</a:t>
+            </a:r>
+            <a:endParaRPr lang="cs-CZ" sz="2400" dirty="0"/>
+          </a:p>
+          <a:p>
+            <a:pPr>
+              <a:lnSpc>
+                <a:spcPct val="95000"/>
+              </a:lnSpc>
+            </a:pPr>
+            <a:r>
+              <a:rPr lang="cs-CZ" sz="2400" dirty="0"/>
+              <a:t>Vytvoření nového </a:t>
+            </a:r>
+            <a:r>
+              <a:rPr lang="cs-CZ" sz="2400" dirty="0" err="1"/>
+              <a:t>parseru</a:t>
+            </a:r>
+            <a:r>
+              <a:rPr lang="cs-CZ" sz="2400" dirty="0"/>
+              <a:t>, který generuje z WooWoo zdroje AST</a:t>
+            </a:r>
+          </a:p>
+          <a:p>
+            <a:pPr>
+              <a:lnSpc>
+                <a:spcPct val="95000"/>
+              </a:lnSpc>
+            </a:pPr>
+            <a:r>
+              <a:rPr lang="cs-CZ" sz="2400" dirty="0"/>
+              <a:t>Překlad AST do HTML</a:t>
+            </a:r>
+          </a:p>
+          <a:p>
+            <a:pPr>
+              <a:lnSpc>
+                <a:spcPct val="95000"/>
+              </a:lnSpc>
+            </a:pPr>
+            <a:r>
+              <a:rPr lang="cs-CZ" sz="2400" dirty="0"/>
+              <a:t>Zobrazení matematických výrazů díky knihovně </a:t>
+            </a:r>
+            <a:r>
+              <a:rPr lang="cs-CZ" sz="2400" dirty="0" err="1"/>
+              <a:t>MathJax</a:t>
+            </a:r>
+            <a:endParaRPr lang="cs-CZ" sz="2400" dirty="0"/>
+          </a:p>
+          <a:p>
+            <a:pPr>
+              <a:lnSpc>
+                <a:spcPct val="95000"/>
+              </a:lnSpc>
+            </a:pPr>
+            <a:r>
+              <a:rPr lang="cs-CZ" sz="2400" dirty="0"/>
+              <a:t>Zobrazení </a:t>
+            </a:r>
+            <a:r>
+              <a:rPr lang="cs-CZ" sz="2400" dirty="0" err="1"/>
+              <a:t>TikZ</a:t>
+            </a:r>
+            <a:r>
+              <a:rPr lang="cs-CZ" sz="2400" dirty="0"/>
+              <a:t> obrázků díky nativní instalaci </a:t>
+            </a:r>
+            <a:r>
+              <a:rPr lang="cs-CZ" sz="2400" dirty="0" err="1"/>
+              <a:t>TeX</a:t>
+            </a:r>
+            <a:r>
+              <a:rPr lang="cs-CZ" sz="2400" dirty="0"/>
+              <a:t> prostředí</a:t>
+            </a:r>
+          </a:p>
+          <a:p>
+            <a:pPr>
+              <a:lnSpc>
+                <a:spcPct val="95000"/>
+              </a:lnSpc>
+            </a:pPr>
+            <a:r>
+              <a:rPr lang="cs-CZ" sz="2400" dirty="0"/>
+              <a:t>Navigace s využitím fuzzy vyhledávání</a:t>
+            </a:r>
+          </a:p>
+        </p:txBody>
+      </p:sp>
     </p:spTree>
     <p:extLst>
       <p:ext uri="{BB962C8B-B14F-4D97-AF65-F5344CB8AC3E}">
-        <p14:creationId xmlns:p14="http://schemas.microsoft.com/office/powerpoint/2010/main" val="2646472029"/>
+        <p14:creationId xmlns:p14="http://schemas.microsoft.com/office/powerpoint/2010/main" val="622366763"/>
       </p:ext>
     </p:extLst>
   </p:cSld>
@@ -6238,7 +6721,7 @@
       </p:grpSpPr>
       <p:sp>
         <p:nvSpPr>
-          <p:cNvPr id="8" name="Rectangle 7">
+          <p:cNvPr id="26" name="Rectangle 25">
             <a:extLst>
               <a:ext uri="{FF2B5EF4-FFF2-40B4-BE49-F238E27FC236}">
                 <a16:creationId xmlns:a16="http://schemas.microsoft.com/office/drawing/2014/main" id="{AA6EC888-B85F-410F-B430-06583E94BEEC}"/>
@@ -6293,7 +6776,7 @@
       </p:sp>
       <p:sp>
         <p:nvSpPr>
-          <p:cNvPr id="10" name="Rectangle 9">
+          <p:cNvPr id="28" name="Rectangle 27">
             <a:extLst>
               <a:ext uri="{FF2B5EF4-FFF2-40B4-BE49-F238E27FC236}">
                 <a16:creationId xmlns:a16="http://schemas.microsoft.com/office/drawing/2014/main" id="{9485DA84-CB73-4E5E-9864-2460CE28055D}"/>
@@ -6356,7 +6839,7 @@
       </p:sp>
       <p:sp>
         <p:nvSpPr>
-          <p:cNvPr id="12" name="Rectangle 11">
+          <p:cNvPr id="30" name="Rectangle 29">
             <a:extLst>
               <a:ext uri="{FF2B5EF4-FFF2-40B4-BE49-F238E27FC236}">
                 <a16:creationId xmlns:a16="http://schemas.microsoft.com/office/drawing/2014/main" id="{7D49185E-361A-421B-8F2D-11C7FFC686F0}"/>
@@ -6419,7 +6902,7 @@
       </p:sp>
       <p:sp>
         <p:nvSpPr>
-          <p:cNvPr id="14" name="Rectangle 13">
+          <p:cNvPr id="32" name="Rectangle 31">
             <a:extLst>
               <a:ext uri="{FF2B5EF4-FFF2-40B4-BE49-F238E27FC236}">
                 <a16:creationId xmlns:a16="http://schemas.microsoft.com/office/drawing/2014/main" id="{14B85BAA-C37F-44B4-B427-B4F10EBB4183}"/>
@@ -6482,7 +6965,7 @@
       </p:sp>
       <p:sp>
         <p:nvSpPr>
-          <p:cNvPr id="16" name="Rectangle 15">
+          <p:cNvPr id="34" name="Rectangle 33">
             <a:extLst>
               <a:ext uri="{FF2B5EF4-FFF2-40B4-BE49-F238E27FC236}">
                 <a16:creationId xmlns:a16="http://schemas.microsoft.com/office/drawing/2014/main" id="{EDC4EE06-D7B4-4FAC-A561-38A1C380232A}"/>
@@ -6545,7 +7028,7 @@
       </p:sp>
       <p:sp>
         <p:nvSpPr>
-          <p:cNvPr id="18" name="Rectangle 17">
+          <p:cNvPr id="36" name="Rectangle 35">
             <a:extLst>
               <a:ext uri="{FF2B5EF4-FFF2-40B4-BE49-F238E27FC236}">
                 <a16:creationId xmlns:a16="http://schemas.microsoft.com/office/drawing/2014/main" id="{9018D83B-903C-4782-B1BB-A45164A71F60}"/>
@@ -6608,7 +7091,7 @@
       </p:sp>
       <p:sp>
         <p:nvSpPr>
-          <p:cNvPr id="20" name="Rectangle 19">
+          <p:cNvPr id="38" name="Rectangle 37">
             <a:extLst>
               <a:ext uri="{FF2B5EF4-FFF2-40B4-BE49-F238E27FC236}">
                 <a16:creationId xmlns:a16="http://schemas.microsoft.com/office/drawing/2014/main" id="{8785589A-A5AC-409A-B2A2-24D871B4CEF0}"/>
@@ -6674,7 +7157,7 @@
           <p:cNvPr id="3" name="Grafický objekt 2">
             <a:extLst>
               <a:ext uri="{FF2B5EF4-FFF2-40B4-BE49-F238E27FC236}">
-                <a16:creationId xmlns:a16="http://schemas.microsoft.com/office/drawing/2014/main" id="{1D394657-D4EA-4D48-BF39-403A08F72895}"/>
+                <a16:creationId xmlns:a16="http://schemas.microsoft.com/office/drawing/2014/main" id="{468592E5-2B68-41AD-BF99-D3842F930CF3}"/>
               </a:ext>
             </a:extLst>
           </p:cNvPr>
@@ -6697,8 +7180,8 @@
         </p:blipFill>
         <p:spPr>
           <a:xfrm>
-            <a:off x="1375918" y="480515"/>
-            <a:ext cx="9440163" cy="5892302"/>
+            <a:off x="693278" y="480515"/>
+            <a:ext cx="10805442" cy="5892302"/>
           </a:xfrm>
           <a:prstGeom prst="rect">
             <a:avLst/>
@@ -6708,7 +7191,7 @@
     </p:spTree>
     <p:extLst>
       <p:ext uri="{BB962C8B-B14F-4D97-AF65-F5344CB8AC3E}">
-        <p14:creationId xmlns:p14="http://schemas.microsoft.com/office/powerpoint/2010/main" val="1441142975"/>
+        <p14:creationId xmlns:p14="http://schemas.microsoft.com/office/powerpoint/2010/main" val="630294877"/>
       </p:ext>
     </p:extLst>
   </p:cSld>
@@ -6721,6 +7204,14 @@
 <file path=ppt/slides/slide9.xml><?xml version="1.0" encoding="utf-8"?>
 <p:sld xmlns:a="http://schemas.openxmlformats.org/drawingml/2006/main" xmlns:r="http://schemas.openxmlformats.org/officeDocument/2006/relationships" xmlns:p="http://schemas.openxmlformats.org/presentationml/2006/main">
   <p:cSld>
+    <p:bg>
+      <p:bgPr>
+        <a:solidFill>
+          <a:schemeClr val="bg2"/>
+        </a:solidFill>
+        <a:effectLst/>
+      </p:bgPr>
+    </p:bg>
     <p:spTree>
       <p:nvGrpSpPr>
         <p:cNvPr id="1" name=""/>
@@ -6737,127 +7228,477 @@
       </p:grpSpPr>
       <p:sp>
         <p:nvSpPr>
-          <p:cNvPr id="2" name="Nadpis 1">
+          <p:cNvPr id="25" name="Rectangle 24">
             <a:extLst>
               <a:ext uri="{FF2B5EF4-FFF2-40B4-BE49-F238E27FC236}">
-                <a16:creationId xmlns:a16="http://schemas.microsoft.com/office/drawing/2014/main" id="{549A5A5D-6404-4273-ABC2-8746AA0BC62C}"/>
+                <a16:creationId xmlns:a16="http://schemas.microsoft.com/office/drawing/2014/main" id="{AA6EC888-B85F-410F-B430-06583E94BEEC}"/>
+              </a:ext>
+              <a:ext uri="{C183D7F6-B498-43B3-948B-1728B52AA6E4}">
+                <adec:decorative xmlns:adec="http://schemas.microsoft.com/office/drawing/2017/decorative" val="1"/>
               </a:ext>
             </a:extLst>
           </p:cNvPr>
           <p:cNvSpPr>
-            <a:spLocks noGrp="1"/>
-          </p:cNvSpPr>
-          <p:nvPr>
-            <p:ph type="title"/>
-          </p:nvPr>
-        </p:nvSpPr>
-        <p:spPr>
-          <a:xfrm>
-            <a:off x="1371600" y="703218"/>
-            <a:ext cx="9601200" cy="1485900"/>
-          </a:xfrm>
-        </p:spPr>
-        <p:txBody>
-          <a:bodyPr>
-            <a:normAutofit/>
-          </a:bodyPr>
-          <a:lstStyle/>
-          <a:p>
-            <a:r>
-              <a:rPr lang="cs-CZ" sz="5400" dirty="0"/>
-              <a:t>Závěr</a:t>
-            </a:r>
-          </a:p>
-        </p:txBody>
-      </p:sp>
-      <p:sp>
-        <p:nvSpPr>
-          <p:cNvPr id="3" name="Zástupný obsah 2">
+            <a:spLocks noGrp="1" noRot="1" noChangeAspect="1" noMove="1" noResize="1" noEditPoints="1" noAdjustHandles="1" noChangeArrowheads="1" noChangeShapeType="1" noTextEdit="1"/>
+          </p:cNvSpPr>
+          <p:nvPr>
+            <p:extLst>
+              <p:ext uri="{386F3935-93C4-4BCD-93E2-E3B085C9AB24}">
+                <p16:designElem xmlns:p16="http://schemas.microsoft.com/office/powerpoint/2015/main" val="1"/>
+              </p:ext>
+            </p:extLst>
+          </p:nvPr>
+        </p:nvSpPr>
+        <p:spPr>
+          <a:xfrm>
+            <a:off x="478095" y="376"/>
+            <a:ext cx="228600" cy="6858000"/>
+          </a:xfrm>
+          <a:prstGeom prst="rect">
+            <a:avLst/>
+          </a:prstGeom>
+          <a:solidFill>
+            <a:schemeClr val="tx2"/>
+          </a:solidFill>
+          <a:ln>
+            <a:noFill/>
+          </a:ln>
+        </p:spPr>
+        <p:style>
+          <a:lnRef idx="2">
+            <a:schemeClr val="accent1">
+              <a:shade val="50000"/>
+            </a:schemeClr>
+          </a:lnRef>
+          <a:fillRef idx="1">
+            <a:schemeClr val="accent1"/>
+          </a:fillRef>
+          <a:effectRef idx="0">
+            <a:schemeClr val="accent1"/>
+          </a:effectRef>
+          <a:fontRef idx="minor">
+            <a:schemeClr val="lt1"/>
+          </a:fontRef>
+        </p:style>
+      </p:sp>
+      <p:sp>
+        <p:nvSpPr>
+          <p:cNvPr id="27" name="Rectangle 26">
             <a:extLst>
               <a:ext uri="{FF2B5EF4-FFF2-40B4-BE49-F238E27FC236}">
-                <a16:creationId xmlns:a16="http://schemas.microsoft.com/office/drawing/2014/main" id="{1EDB8F96-D142-46B1-9AEA-ABE2773ED79C}"/>
+                <a16:creationId xmlns:a16="http://schemas.microsoft.com/office/drawing/2014/main" id="{9485DA84-CB73-4E5E-9864-2460CE28055D}"/>
+              </a:ext>
+              <a:ext uri="{C183D7F6-B498-43B3-948B-1728B52AA6E4}">
+                <adec:decorative xmlns:adec="http://schemas.microsoft.com/office/drawing/2017/decorative" val="1"/>
               </a:ext>
             </a:extLst>
           </p:cNvPr>
           <p:cNvSpPr>
-            <a:spLocks noGrp="1"/>
-          </p:cNvSpPr>
-          <p:nvPr>
-            <p:ph idx="1"/>
-          </p:nvPr>
-        </p:nvSpPr>
-        <p:spPr>
-          <a:xfrm>
-            <a:off x="1371600" y="2094407"/>
-            <a:ext cx="9601200" cy="3931923"/>
-          </a:xfrm>
-        </p:spPr>
-        <p:txBody>
-          <a:bodyPr>
-            <a:noAutofit/>
-          </a:bodyPr>
+            <a:spLocks noGrp="1" noRot="1" noChangeAspect="1" noMove="1" noResize="1" noEditPoints="1" noAdjustHandles="1" noChangeArrowheads="1" noChangeShapeType="1" noTextEdit="1"/>
+          </p:cNvSpPr>
+          <p:nvPr>
+            <p:extLst>
+              <p:ext uri="{386F3935-93C4-4BCD-93E2-E3B085C9AB24}">
+                <p16:designElem xmlns:p16="http://schemas.microsoft.com/office/powerpoint/2015/main" val="1"/>
+              </p:ext>
+            </p:extLst>
+          </p:nvPr>
+        </p:nvSpPr>
+        <p:spPr>
+          <a:xfrm>
+            <a:off x="0" y="0"/>
+            <a:ext cx="12192000" cy="6858000"/>
+          </a:xfrm>
+          <a:prstGeom prst="rect">
+            <a:avLst/>
+          </a:prstGeom>
+          <a:solidFill>
+            <a:schemeClr val="bg2"/>
+          </a:solidFill>
+          <a:ln>
+            <a:noFill/>
+          </a:ln>
+        </p:spPr>
+        <p:style>
+          <a:lnRef idx="2">
+            <a:schemeClr val="accent1">
+              <a:shade val="50000"/>
+            </a:schemeClr>
+          </a:lnRef>
+          <a:fillRef idx="1">
+            <a:schemeClr val="accent1"/>
+          </a:fillRef>
+          <a:effectRef idx="0">
+            <a:schemeClr val="accent1"/>
+          </a:effectRef>
+          <a:fontRef idx="minor">
+            <a:schemeClr val="lt1"/>
+          </a:fontRef>
+        </p:style>
+        <p:txBody>
+          <a:bodyPr rtlCol="0" anchor="ctr"/>
           <a:lstStyle/>
           <a:p>
-            <a:pPr>
-              <a:lnSpc>
-                <a:spcPct val="95000"/>
-              </a:lnSpc>
-            </a:pPr>
-            <a:r>
-              <a:rPr lang="cs-CZ" sz="2400" dirty="0"/>
-              <a:t>Seznámení se s WooWoo</a:t>
-            </a:r>
-          </a:p>
-          <a:p>
-            <a:pPr>
-              <a:lnSpc>
-                <a:spcPct val="95000"/>
-              </a:lnSpc>
-            </a:pPr>
-            <a:r>
-              <a:rPr lang="cs-CZ" sz="2400" dirty="0"/>
-              <a:t>Prozkoumání možností rozšíření vybraných editorů</a:t>
-            </a:r>
-          </a:p>
-          <a:p>
-            <a:pPr>
-              <a:lnSpc>
-                <a:spcPct val="95000"/>
-              </a:lnSpc>
-            </a:pPr>
-            <a:r>
-              <a:rPr lang="cs-CZ" sz="2400" dirty="0"/>
-              <a:t>Návrh, implementace a testování rozšíření editoru Atom pro podporu tvorby WooWoo dokumentů</a:t>
-            </a:r>
-          </a:p>
-          <a:p>
-            <a:pPr>
-              <a:lnSpc>
-                <a:spcPct val="95000"/>
-              </a:lnSpc>
-            </a:pPr>
-            <a:r>
-              <a:rPr lang="cs-CZ" sz="2400" dirty="0"/>
-              <a:t>Možnost mnoha vylepšení v budoucnu (synchronní posun náhledu, zobrazení celého dokumentu, podpora více šablon, …)</a:t>
-            </a:r>
-          </a:p>
-          <a:p>
-            <a:pPr>
-              <a:lnSpc>
-                <a:spcPct val="95000"/>
-              </a:lnSpc>
-            </a:pPr>
-            <a:r>
-              <a:rPr lang="cs-CZ" sz="2400" dirty="0"/>
-              <a:t>Usnadnění tvorby studijních textů</a:t>
-            </a:r>
-          </a:p>
-        </p:txBody>
-      </p:sp>
+            <a:pPr algn="ctr"/>
+            <a:endParaRPr lang="en-US"/>
+          </a:p>
+        </p:txBody>
+      </p:sp>
+      <p:sp>
+        <p:nvSpPr>
+          <p:cNvPr id="29" name="Rectangle 28">
+            <a:extLst>
+              <a:ext uri="{FF2B5EF4-FFF2-40B4-BE49-F238E27FC236}">
+                <a16:creationId xmlns:a16="http://schemas.microsoft.com/office/drawing/2014/main" id="{7D49185E-361A-421B-8F2D-11C7FFC686F0}"/>
+              </a:ext>
+              <a:ext uri="{C183D7F6-B498-43B3-948B-1728B52AA6E4}">
+                <adec:decorative xmlns:adec="http://schemas.microsoft.com/office/drawing/2017/decorative" val="1"/>
+              </a:ext>
+            </a:extLst>
+          </p:cNvPr>
+          <p:cNvSpPr>
+            <a:spLocks noGrp="1" noRot="1" noChangeAspect="1" noMove="1" noResize="1" noEditPoints="1" noAdjustHandles="1" noChangeArrowheads="1" noChangeShapeType="1" noTextEdit="1"/>
+          </p:cNvSpPr>
+          <p:nvPr>
+            <p:extLst>
+              <p:ext uri="{386F3935-93C4-4BCD-93E2-E3B085C9AB24}">
+                <p16:designElem xmlns:p16="http://schemas.microsoft.com/office/powerpoint/2015/main" val="1"/>
+              </p:ext>
+            </p:extLst>
+          </p:nvPr>
+        </p:nvSpPr>
+        <p:spPr>
+          <a:xfrm>
+            <a:off x="0" y="0"/>
+            <a:ext cx="365760" cy="365760"/>
+          </a:xfrm>
+          <a:prstGeom prst="rect">
+            <a:avLst/>
+          </a:prstGeom>
+          <a:solidFill>
+            <a:schemeClr val="tx1"/>
+          </a:solidFill>
+          <a:ln>
+            <a:noFill/>
+          </a:ln>
+        </p:spPr>
+        <p:style>
+          <a:lnRef idx="2">
+            <a:schemeClr val="accent1">
+              <a:shade val="50000"/>
+            </a:schemeClr>
+          </a:lnRef>
+          <a:fillRef idx="1">
+            <a:schemeClr val="accent1"/>
+          </a:fillRef>
+          <a:effectRef idx="0">
+            <a:schemeClr val="accent1"/>
+          </a:effectRef>
+          <a:fontRef idx="minor">
+            <a:schemeClr val="lt1"/>
+          </a:fontRef>
+        </p:style>
+        <p:txBody>
+          <a:bodyPr rtlCol="0" anchor="ctr"/>
+          <a:lstStyle/>
+          <a:p>
+            <a:pPr algn="ctr"/>
+            <a:endParaRPr lang="en-US"/>
+          </a:p>
+        </p:txBody>
+      </p:sp>
+      <p:sp>
+        <p:nvSpPr>
+          <p:cNvPr id="31" name="Rectangle 30">
+            <a:extLst>
+              <a:ext uri="{FF2B5EF4-FFF2-40B4-BE49-F238E27FC236}">
+                <a16:creationId xmlns:a16="http://schemas.microsoft.com/office/drawing/2014/main" id="{14B85BAA-C37F-44B4-B427-B4F10EBB4183}"/>
+              </a:ext>
+              <a:ext uri="{C183D7F6-B498-43B3-948B-1728B52AA6E4}">
+                <adec:decorative xmlns:adec="http://schemas.microsoft.com/office/drawing/2017/decorative" val="1"/>
+              </a:ext>
+            </a:extLst>
+          </p:cNvPr>
+          <p:cNvSpPr>
+            <a:spLocks noGrp="1" noRot="1" noChangeAspect="1" noMove="1" noResize="1" noEditPoints="1" noAdjustHandles="1" noChangeArrowheads="1" noChangeShapeType="1" noTextEdit="1"/>
+          </p:cNvSpPr>
+          <p:nvPr>
+            <p:extLst>
+              <p:ext uri="{386F3935-93C4-4BCD-93E2-E3B085C9AB24}">
+                <p16:designElem xmlns:p16="http://schemas.microsoft.com/office/powerpoint/2015/main" val="1"/>
+              </p:ext>
+            </p:extLst>
+          </p:nvPr>
+        </p:nvSpPr>
+        <p:spPr>
+          <a:xfrm>
+            <a:off x="11826240" y="-4668"/>
+            <a:ext cx="365760" cy="365760"/>
+          </a:xfrm>
+          <a:prstGeom prst="rect">
+            <a:avLst/>
+          </a:prstGeom>
+          <a:solidFill>
+            <a:schemeClr val="tx1"/>
+          </a:solidFill>
+          <a:ln>
+            <a:noFill/>
+          </a:ln>
+        </p:spPr>
+        <p:style>
+          <a:lnRef idx="2">
+            <a:schemeClr val="accent1">
+              <a:shade val="50000"/>
+            </a:schemeClr>
+          </a:lnRef>
+          <a:fillRef idx="1">
+            <a:schemeClr val="accent1"/>
+          </a:fillRef>
+          <a:effectRef idx="0">
+            <a:schemeClr val="accent1"/>
+          </a:effectRef>
+          <a:fontRef idx="minor">
+            <a:schemeClr val="lt1"/>
+          </a:fontRef>
+        </p:style>
+        <p:txBody>
+          <a:bodyPr rtlCol="0" anchor="ctr"/>
+          <a:lstStyle/>
+          <a:p>
+            <a:pPr algn="ctr"/>
+            <a:endParaRPr lang="en-US"/>
+          </a:p>
+        </p:txBody>
+      </p:sp>
+      <p:sp>
+        <p:nvSpPr>
+          <p:cNvPr id="33" name="Rectangle 32">
+            <a:extLst>
+              <a:ext uri="{FF2B5EF4-FFF2-40B4-BE49-F238E27FC236}">
+                <a16:creationId xmlns:a16="http://schemas.microsoft.com/office/drawing/2014/main" id="{EDC4EE06-D7B4-4FAC-A561-38A1C380232A}"/>
+              </a:ext>
+              <a:ext uri="{C183D7F6-B498-43B3-948B-1728B52AA6E4}">
+                <adec:decorative xmlns:adec="http://schemas.microsoft.com/office/drawing/2017/decorative" val="1"/>
+              </a:ext>
+            </a:extLst>
+          </p:cNvPr>
+          <p:cNvSpPr>
+            <a:spLocks noGrp="1" noRot="1" noChangeAspect="1" noMove="1" noResize="1" noEditPoints="1" noAdjustHandles="1" noChangeArrowheads="1" noChangeShapeType="1" noTextEdit="1"/>
+          </p:cNvSpPr>
+          <p:nvPr>
+            <p:extLst>
+              <p:ext uri="{386F3935-93C4-4BCD-93E2-E3B085C9AB24}">
+                <p16:designElem xmlns:p16="http://schemas.microsoft.com/office/powerpoint/2015/main" val="1"/>
+              </p:ext>
+            </p:extLst>
+          </p:nvPr>
+        </p:nvSpPr>
+        <p:spPr>
+          <a:xfrm>
+            <a:off x="0" y="6494325"/>
+            <a:ext cx="365760" cy="365760"/>
+          </a:xfrm>
+          <a:prstGeom prst="rect">
+            <a:avLst/>
+          </a:prstGeom>
+          <a:solidFill>
+            <a:schemeClr val="tx1"/>
+          </a:solidFill>
+          <a:ln>
+            <a:noFill/>
+          </a:ln>
+        </p:spPr>
+        <p:style>
+          <a:lnRef idx="2">
+            <a:schemeClr val="accent1">
+              <a:shade val="50000"/>
+            </a:schemeClr>
+          </a:lnRef>
+          <a:fillRef idx="1">
+            <a:schemeClr val="accent1"/>
+          </a:fillRef>
+          <a:effectRef idx="0">
+            <a:schemeClr val="accent1"/>
+          </a:effectRef>
+          <a:fontRef idx="minor">
+            <a:schemeClr val="lt1"/>
+          </a:fontRef>
+        </p:style>
+        <p:txBody>
+          <a:bodyPr rtlCol="0" anchor="ctr"/>
+          <a:lstStyle/>
+          <a:p>
+            <a:pPr algn="ctr"/>
+            <a:endParaRPr lang="en-US"/>
+          </a:p>
+        </p:txBody>
+      </p:sp>
+      <p:sp>
+        <p:nvSpPr>
+          <p:cNvPr id="35" name="Rectangle 34">
+            <a:extLst>
+              <a:ext uri="{FF2B5EF4-FFF2-40B4-BE49-F238E27FC236}">
+                <a16:creationId xmlns:a16="http://schemas.microsoft.com/office/drawing/2014/main" id="{9018D83B-903C-4782-B1BB-A45164A71F60}"/>
+              </a:ext>
+              <a:ext uri="{C183D7F6-B498-43B3-948B-1728B52AA6E4}">
+                <adec:decorative xmlns:adec="http://schemas.microsoft.com/office/drawing/2017/decorative" val="1"/>
+              </a:ext>
+            </a:extLst>
+          </p:cNvPr>
+          <p:cNvSpPr>
+            <a:spLocks noGrp="1" noRot="1" noChangeAspect="1" noMove="1" noResize="1" noEditPoints="1" noAdjustHandles="1" noChangeArrowheads="1" noChangeShapeType="1" noTextEdit="1"/>
+          </p:cNvSpPr>
+          <p:nvPr>
+            <p:extLst>
+              <p:ext uri="{386F3935-93C4-4BCD-93E2-E3B085C9AB24}">
+                <p16:designElem xmlns:p16="http://schemas.microsoft.com/office/powerpoint/2015/main" val="1"/>
+              </p:ext>
+            </p:extLst>
+          </p:nvPr>
+        </p:nvSpPr>
+        <p:spPr>
+          <a:xfrm>
+            <a:off x="11826240" y="6494325"/>
+            <a:ext cx="365760" cy="365760"/>
+          </a:xfrm>
+          <a:prstGeom prst="rect">
+            <a:avLst/>
+          </a:prstGeom>
+          <a:solidFill>
+            <a:schemeClr val="tx1"/>
+          </a:solidFill>
+          <a:ln>
+            <a:noFill/>
+          </a:ln>
+        </p:spPr>
+        <p:style>
+          <a:lnRef idx="2">
+            <a:schemeClr val="accent1">
+              <a:shade val="50000"/>
+            </a:schemeClr>
+          </a:lnRef>
+          <a:fillRef idx="1">
+            <a:schemeClr val="accent1"/>
+          </a:fillRef>
+          <a:effectRef idx="0">
+            <a:schemeClr val="accent1"/>
+          </a:effectRef>
+          <a:fontRef idx="minor">
+            <a:schemeClr val="lt1"/>
+          </a:fontRef>
+        </p:style>
+        <p:txBody>
+          <a:bodyPr rtlCol="0" anchor="ctr"/>
+          <a:lstStyle/>
+          <a:p>
+            <a:pPr algn="ctr"/>
+            <a:endParaRPr lang="en-US"/>
+          </a:p>
+        </p:txBody>
+      </p:sp>
+      <p:sp>
+        <p:nvSpPr>
+          <p:cNvPr id="37" name="Rectangle 36">
+            <a:extLst>
+              <a:ext uri="{FF2B5EF4-FFF2-40B4-BE49-F238E27FC236}">
+                <a16:creationId xmlns:a16="http://schemas.microsoft.com/office/drawing/2014/main" id="{8785589A-A5AC-409A-B2A2-24D871B4CEF0}"/>
+              </a:ext>
+              <a:ext uri="{C183D7F6-B498-43B3-948B-1728B52AA6E4}">
+                <adec:decorative xmlns:adec="http://schemas.microsoft.com/office/drawing/2017/decorative" val="1"/>
+              </a:ext>
+            </a:extLst>
+          </p:cNvPr>
+          <p:cNvSpPr>
+            <a:spLocks noGrp="1" noRot="1" noChangeAspect="1" noMove="1" noResize="1" noEditPoints="1" noAdjustHandles="1" noChangeArrowheads="1" noChangeShapeType="1" noTextEdit="1"/>
+          </p:cNvSpPr>
+          <p:nvPr>
+            <p:extLst>
+              <p:ext uri="{386F3935-93C4-4BCD-93E2-E3B085C9AB24}">
+                <p16:designElem xmlns:p16="http://schemas.microsoft.com/office/powerpoint/2015/main" val="1"/>
+              </p:ext>
+            </p:extLst>
+          </p:nvPr>
+        </p:nvSpPr>
+        <p:spPr>
+          <a:xfrm>
+            <a:off x="160867" y="158782"/>
+            <a:ext cx="11870265" cy="6537850"/>
+          </a:xfrm>
+          <a:prstGeom prst="rect">
+            <a:avLst/>
+          </a:prstGeom>
+          <a:solidFill>
+            <a:srgbClr val="FFFFFF"/>
+          </a:solidFill>
+          <a:ln>
+            <a:noFill/>
+          </a:ln>
+        </p:spPr>
+        <p:style>
+          <a:lnRef idx="2">
+            <a:schemeClr val="accent1">
+              <a:shade val="50000"/>
+            </a:schemeClr>
+          </a:lnRef>
+          <a:fillRef idx="1">
+            <a:schemeClr val="accent1"/>
+          </a:fillRef>
+          <a:effectRef idx="0">
+            <a:schemeClr val="accent1"/>
+          </a:effectRef>
+          <a:fontRef idx="minor">
+            <a:schemeClr val="lt1"/>
+          </a:fontRef>
+        </p:style>
+        <p:txBody>
+          <a:bodyPr rtlCol="0" anchor="ctr"/>
+          <a:lstStyle/>
+          <a:p>
+            <a:pPr algn="ctr"/>
+            <a:endParaRPr lang="en-US"/>
+          </a:p>
+        </p:txBody>
+      </p:sp>
+      <p:pic>
+        <p:nvPicPr>
+          <p:cNvPr id="4" name="Grafický objekt 3">
+            <a:extLst>
+              <a:ext uri="{FF2B5EF4-FFF2-40B4-BE49-F238E27FC236}">
+                <a16:creationId xmlns:a16="http://schemas.microsoft.com/office/drawing/2014/main" id="{923D550E-FFB3-4758-B95D-66B8D5FB34E3}"/>
+              </a:ext>
+            </a:extLst>
+          </p:cNvPr>
+          <p:cNvPicPr>
+            <a:picLocks noChangeAspect="1"/>
+          </p:cNvPicPr>
+          <p:nvPr/>
+        </p:nvPicPr>
+        <p:blipFill>
+          <a:blip r:embed="rId2">
+            <a:extLst>
+              <a:ext uri="{96DAC541-7B7A-43D3-8B79-37D633B846F1}">
+                <asvg:svgBlip xmlns:asvg="http://schemas.microsoft.com/office/drawing/2016/SVG/main" r:embed="rId3"/>
+              </a:ext>
+            </a:extLst>
+          </a:blip>
+          <a:stretch>
+            <a:fillRect/>
+          </a:stretch>
+        </p:blipFill>
+        <p:spPr>
+          <a:xfrm>
+            <a:off x="693278" y="480515"/>
+            <a:ext cx="10805442" cy="5892302"/>
+          </a:xfrm>
+          <a:prstGeom prst="rect">
+            <a:avLst/>
+          </a:prstGeom>
+        </p:spPr>
+      </p:pic>
     </p:spTree>
     <p:extLst>
       <p:ext uri="{BB962C8B-B14F-4D97-AF65-F5344CB8AC3E}">
-        <p14:creationId xmlns:p14="http://schemas.microsoft.com/office/powerpoint/2010/main" val="368420680"/>
+        <p14:creationId xmlns:p14="http://schemas.microsoft.com/office/powerpoint/2010/main" val="1441142975"/>
       </p:ext>
     </p:extLst>
   </p:cSld>

</xml_diff>